<commit_message>
added builds for html & pdf ppt
</commit_message>
<xml_diff>
--- a/building-blocks/problem-statement/Architecture-Challenge.pptx
+++ b/building-blocks/problem-statement/Architecture-Challenge.pptx
@@ -22,6 +22,13 @@
     <p:sldId id="270" r:id="rId16"/>
     <p:sldId id="271" r:id="rId17"/>
     <p:sldId id="272" r:id="rId18"/>
+    <p:sldId id="273" r:id="rId19"/>
+    <p:sldId id="274" r:id="rId20"/>
+    <p:sldId id="275" r:id="rId21"/>
+    <p:sldId id="276" r:id="rId22"/>
+    <p:sldId id="277" r:id="rId23"/>
+    <p:sldId id="278" r:id="rId24"/>
+    <p:sldId id="279" r:id="rId25"/>
   </p:sldIdLst>
   <p:sldSz cx="9144000" cy="5143500" type="screen16x9"/>
   <p:notesSz cx="6858000" cy="9144000"/>
@@ -3220,7 +3227,7 @@
             </a:pPr>
             <a:r>
               <a:rPr/>
-              <a:t>Introduction</a:t>
+              <a:t>The Invitation</a:t>
             </a:r>
           </a:p>
         </p:txBody>
@@ -3240,45 +3247,12 @@
           <a:bodyPr/>
           <a:lstStyle/>
           <a:p>
-            <a:pPr lvl="0" indent="0" marL="0">
-              <a:spcBef>
-                <a:spcPts val="3000"/>
-              </a:spcBef>
-              <a:buNone/>
-            </a:pPr>
-            <a:r>
-              <a:rPr b="1"/>
-              <a:t>Purpose - explain the purpose of the workshop</a:t>
-            </a:r>
-          </a:p>
-          <a:p>
-            <a:pPr lvl="0" indent="0" marL="0">
-              <a:spcBef>
-                <a:spcPts val="3000"/>
-              </a:spcBef>
-              <a:buNone/>
-            </a:pPr>
-            <a:r>
-              <a:rPr b="1"/>
-              <a:t>Duration - 15 minutes</a:t>
-            </a:r>
-          </a:p>
-          <a:p>
-            <a:pPr lvl="0" indent="-342900" marL="342900">
-              <a:buAutoNum type="arabicPeriod"/>
-            </a:pPr>
-            <a:r>
-              <a:rPr/>
-              <a:t>Introduction</a:t>
-            </a:r>
-          </a:p>
-          <a:p>
             <a:pPr lvl="0" indent="0" marL="1270000">
               <a:buNone/>
             </a:pPr>
             <a:r>
               <a:rPr sz="2000" i="1"/>
-              <a:t>We are here to discuss [the challenge]</a:t>
+              <a:t>Hi AP</a:t>
             </a:r>
           </a:p>
           <a:p>
@@ -3287,67 +3261,42 @@
             </a:pPr>
             <a:r>
               <a:rPr sz="2000" i="1"/>
-              <a:t>The purpose of this workshop is to</a:t>
-            </a:r>
-          </a:p>
-          <a:p>
-            <a:pPr lvl="0"/>
+              <a:t>As I am sure you are aware we have major challenges with providing insights to leaders within the business.</a:t>
+            </a:r>
+          </a:p>
+          <a:p>
+            <a:pPr lvl="0" indent="0" marL="1270000">
+              <a:buNone/>
+            </a:pPr>
             <a:r>
               <a:rPr sz="2000" i="1"/>
-              <a:t>Clearly define the problem​</a:t>
-            </a:r>
-          </a:p>
-          <a:p>
-            <a:pPr lvl="0"/>
+              <a:t>We are running a workshop to develop a strong problem statement and work out how to kick off an initiative to improve the situation.</a:t>
+            </a:r>
+            <a:r>
+              <a:rPr sz="2000"/>
+              <a:t> </a:t>
+            </a:r>
             <a:r>
               <a:rPr sz="2000" i="1"/>
-              <a:t>Understand what successful resolution looks like​</a:t>
-            </a:r>
-          </a:p>
-          <a:p>
-            <a:pPr lvl="0"/>
+              <a:t>You will see an invitation to a video call in your inbox soon.</a:t>
+            </a:r>
+          </a:p>
+          <a:p>
+            <a:pPr lvl="0" indent="0" marL="1270000">
+              <a:buNone/>
+            </a:pPr>
             <a:r>
               <a:rPr sz="2000" i="1"/>
-              <a:t>Identify the key stakeholders who must commit to delivering success​</a:t>
-            </a:r>
-          </a:p>
-          <a:p>
-            <a:pPr lvl="0"/>
+              <a:t>I am looking forward to your valuable contribution.</a:t>
+            </a:r>
+          </a:p>
+          <a:p>
+            <a:pPr lvl="0" indent="0" marL="1270000">
+              <a:buNone/>
+            </a:pPr>
             <a:r>
               <a:rPr sz="2000" i="1"/>
-              <a:t>Determine the of enterprise architecture</a:t>
-            </a:r>
-          </a:p>
-          <a:p>
-            <a:pPr lvl="0" indent="-342900" marL="342900">
-              <a:buAutoNum startAt="2" type="arabicPeriod"/>
-            </a:pPr>
-            <a:r>
-              <a:rPr/>
-              <a:t>Quick personal introductions if everyone does not know each other</a:t>
-            </a:r>
-          </a:p>
-          <a:p>
-            <a:pPr lvl="1"/>
-            <a:r>
-              <a:rPr/>
-              <a:t>name</a:t>
-            </a:r>
-          </a:p>
-          <a:p>
-            <a:pPr lvl="1"/>
-            <a:r>
-              <a:rPr/>
-              <a:t>2 words describing what you do</a:t>
-            </a:r>
-          </a:p>
-          <a:p>
-            <a:pPr lvl="0" indent="-342900" marL="342900">
-              <a:buAutoNum startAt="2" type="arabicPeriod"/>
-            </a:pPr>
-            <a:r>
-              <a:rPr/>
-              <a:t>The challenge</a:t>
+              <a:t>Best wishes</a:t>
             </a:r>
           </a:p>
           <a:p>
@@ -3356,25 +3305,7 @@
             </a:pPr>
             <a:r>
               <a:rPr sz="2000" i="1"/>
-              <a:t>[challenge owner] will now set the scene for the workshop by briefly describing the challenge</a:t>
-            </a:r>
-          </a:p>
-          <a:p>
-            <a:pPr lvl="0" indent="0" marL="1270000">
-              <a:buNone/>
-            </a:pPr>
-            <a:r>
-              <a:rPr sz="2000" i="1"/>
-              <a:t>The challenge that we see is [challenge description]</a:t>
-            </a:r>
-          </a:p>
-          <a:p>
-            <a:pPr lvl="0" indent="0" marL="1270000">
-              <a:buNone/>
-            </a:pPr>
-            <a:r>
-              <a:rPr sz="2000" i="1"/>
-              <a:t>We don’t have strong evidence but the impact that we see anecdotally is [examples]</a:t>
+              <a:t>JJ - Head of Enterprise Architecture</a:t>
             </a:r>
           </a:p>
         </p:txBody>
@@ -3421,7 +3352,7 @@
             </a:pPr>
             <a:r>
               <a:rPr/>
-              <a:t>Problem</a:t>
+              <a:t>Roles</a:t>
             </a:r>
           </a:p>
         </p:txBody>
@@ -3442,211 +3373,39 @@
           <a:lstStyle/>
           <a:p>
             <a:pPr lvl="0" indent="0" marL="0">
-              <a:spcBef>
-                <a:spcPts val="3000"/>
-              </a:spcBef>
-              <a:buNone/>
-            </a:pPr>
-            <a:r>
-              <a:rPr b="1"/>
-              <a:t>Purpose - create a description of the business problem</a:t>
-            </a:r>
-          </a:p>
-          <a:p>
-            <a:pPr lvl="0" indent="0" marL="0">
-              <a:spcBef>
-                <a:spcPts val="3000"/>
-              </a:spcBef>
-              <a:buNone/>
-            </a:pPr>
-            <a:r>
-              <a:rPr b="1"/>
-              <a:t>Duration - 1 hour</a:t>
-            </a:r>
-          </a:p>
-          <a:p>
-            <a:pPr lvl="0" indent="-342900" marL="342900">
-              <a:buAutoNum type="arabicPeriod"/>
-            </a:pPr>
-            <a:r>
-              <a:rPr/>
-              <a:t>Ask the participants to write down 2-3 bullet points that describe their perspective on the challenge</a:t>
-            </a:r>
-          </a:p>
-          <a:p>
-            <a:pPr lvl="1"/>
-            <a:r>
-              <a:rPr/>
-              <a:t>Write the notes individually without discussion and without showing them</a:t>
-            </a:r>
-          </a:p>
-          <a:p>
-            <a:pPr lvl="1"/>
-            <a:r>
-              <a:rPr/>
-              <a:t>What is the root cause?</a:t>
-            </a:r>
-          </a:p>
-          <a:p>
-            <a:pPr lvl="1"/>
-            <a:r>
-              <a:rPr/>
-              <a:t>Why is it important to address the challenge?</a:t>
-            </a:r>
-          </a:p>
-          <a:p>
-            <a:pPr lvl="1"/>
-            <a:r>
-              <a:rPr/>
-              <a:t>Do not think about solutions</a:t>
-            </a:r>
-          </a:p>
-          <a:p>
-            <a:pPr lvl="0" indent="-342900" marL="342900">
-              <a:buAutoNum type="arabicPeriod"/>
-            </a:pPr>
-            <a:r>
-              <a:rPr/>
-              <a:t>All participants show their notes at the same time</a:t>
-            </a:r>
-          </a:p>
-          <a:p>
-            <a:pPr lvl="0" indent="-342900" marL="342900">
-              <a:buAutoNum type="arabicPeriod"/>
-            </a:pPr>
-            <a:r>
-              <a:rPr/>
-              <a:t>The facilitator talks through each note in turn</a:t>
-            </a:r>
-          </a:p>
-          <a:p>
-            <a:pPr lvl="0" indent="-342900" marL="342900">
-              <a:buAutoNum type="arabicPeriod"/>
-            </a:pPr>
-            <a:r>
-              <a:rPr/>
-              <a:t>The facilitator creates a summary note that captures the agreement and divergence of the team’s contributions</a:t>
-            </a:r>
-          </a:p>
-          <a:p>
-            <a:pPr lvl="0" indent="-342900" marL="342900">
-              <a:buAutoNum type="arabicPeriod"/>
-            </a:pPr>
-            <a:r>
-              <a:rPr/>
-              <a:t>The facilitator asks for any further thoughts from the team and adds to the summary if necessary</a:t>
-            </a:r>
-          </a:p>
-          <a:p>
-            <a:pPr lvl="0" indent="-342900" marL="342900">
-              <a:buAutoNum type="arabicPeriod"/>
-            </a:pPr>
-            <a:r>
-              <a:rPr/>
-              <a:t>The facilitator then leads an analysis of the summary to firm up the problem description and resolve any disagreements. The following questions can be used as a start point -</a:t>
-            </a:r>
-          </a:p>
-          <a:p>
-            <a:pPr lvl="1"/>
-            <a:r>
-              <a:rPr/>
-              <a:t>How does this damage the business?​</a:t>
-            </a:r>
-          </a:p>
-          <a:p>
-            <a:pPr lvl="1"/>
-            <a:r>
-              <a:rPr/>
-              <a:t>Will key business stakeholders recognise the problem?</a:t>
-            </a:r>
-          </a:p>
-          <a:p>
-            <a:pPr lvl="1"/>
-            <a:r>
-              <a:rPr/>
-              <a:t>What makes it </a:t>
-            </a:r>
-            <a:r>
-              <a:rPr b="1"/>
-              <a:t>significant</a:t>
-            </a:r>
-            <a:r>
-              <a:rPr/>
-              <a:t>​ to the business stakeholders?</a:t>
-            </a:r>
-          </a:p>
-          <a:p>
-            <a:pPr lvl="1"/>
-            <a:r>
-              <a:rPr/>
-              <a:t>What makes it important to do something now?​</a:t>
-            </a:r>
-          </a:p>
-          <a:p>
-            <a:pPr lvl="1"/>
-            <a:r>
-              <a:rPr/>
-              <a:t>What value will enterprise architects bring to the challenge?</a:t>
-            </a:r>
-          </a:p>
-          <a:p>
-            <a:pPr lvl="0" indent="-342900" marL="342900">
-              <a:buAutoNum type="arabicPeriod"/>
-            </a:pPr>
-            <a:r>
-              <a:rPr/>
-              <a:t>The facilitator summarises the discussion under the following headings -</a:t>
-            </a:r>
-          </a:p>
-          <a:p>
-            <a:pPr lvl="1"/>
-            <a:r>
-              <a:rPr/>
-              <a:t>Problem statement highlighting the negative impact on the business</a:t>
-            </a:r>
-          </a:p>
-          <a:p>
-            <a:pPr lvl="1"/>
-            <a:r>
-              <a:rPr/>
-              <a:t>Who is impacted negatively by the problem?</a:t>
-            </a:r>
-          </a:p>
-          <a:p>
-            <a:pPr lvl="1"/>
-            <a:r>
-              <a:rPr/>
-              <a:t>Who benefits from the problem?</a:t>
-            </a:r>
-          </a:p>
-          <a:p>
-            <a:pPr lvl="1"/>
-            <a:r>
-              <a:rPr/>
-              <a:t>Why is is important now?</a:t>
-            </a:r>
-          </a:p>
-          <a:p>
-            <a:pPr lvl="1"/>
-            <a:r>
-              <a:rPr/>
-              <a:t>What important things don’t we know?</a:t>
-            </a:r>
-          </a:p>
-          <a:p>
-            <a:pPr lvl="1"/>
-            <a:r>
-              <a:rPr/>
-              <a:t>How can enterprise architects help?</a:t>
-            </a:r>
-          </a:p>
-          <a:p>
-            <a:pPr lvl="0" indent="0" marL="0">
-              <a:buNone/>
-            </a:pPr>
-            <a:r>
-              <a:rPr/>
-              <a:t>Now it’s time to take a short break!</a:t>
+              <a:buNone/>
+            </a:pPr>
+            <a:r>
+              <a:rPr/>
+              <a:t>The workshop will require these roles to be successful -</a:t>
+            </a:r>
+          </a:p>
+          <a:p>
+            <a:pPr lvl="0"/>
+            <a:r>
+              <a:rPr/>
+              <a:t>Facilitator - takes the attendees through the workshop structure, adapting it as necessary, owns the schedule</a:t>
+            </a:r>
+          </a:p>
+          <a:p>
+            <a:pPr lvl="0"/>
+            <a:r>
+              <a:rPr/>
+              <a:t>Challenge owner - presents the challenge, makes decisions when asked to do so by the Facilitator, maybe a proxy for a key stakeholder</a:t>
+            </a:r>
+          </a:p>
+          <a:p>
+            <a:pPr lvl="0"/>
+            <a:r>
+              <a:rPr/>
+              <a:t>Scribe - makes notes when asked to do so by the facilitator</a:t>
+            </a:r>
+          </a:p>
+          <a:p>
+            <a:pPr lvl="0"/>
+            <a:r>
+              <a:rPr/>
+              <a:t>Timekeeper - keeps time when asked to do so by the facilitator</a:t>
             </a:r>
           </a:p>
         </p:txBody>
@@ -3693,7 +3452,7 @@
             </a:pPr>
             <a:r>
               <a:rPr/>
-              <a:t>Success</a:t>
+              <a:t>Ground rules</a:t>
             </a:r>
           </a:p>
         </p:txBody>
@@ -3712,66 +3471,13 @@
         <p:txBody>
           <a:bodyPr/>
           <a:lstStyle/>
-          <a:p>
-            <a:pPr lvl="0" indent="0" marL="0">
-              <a:spcBef>
-                <a:spcPts val="3000"/>
-              </a:spcBef>
-              <a:buNone/>
-            </a:pPr>
-            <a:r>
-              <a:rPr b="1"/>
-              <a:t>Purpose - create an ambitious description of what it will like when we have solved the problem</a:t>
-            </a:r>
-          </a:p>
-          <a:p>
-            <a:pPr lvl="0" indent="0" marL="0">
-              <a:spcBef>
-                <a:spcPts val="3000"/>
-              </a:spcBef>
-              <a:buNone/>
-            </a:pPr>
-            <a:r>
-              <a:rPr b="1"/>
-              <a:t>Duration - 45 minutes</a:t>
-            </a:r>
-          </a:p>
           <a:p>
             <a:pPr lvl="0" indent="-342900" marL="342900">
               <a:buAutoNum type="arabicPeriod"/>
             </a:pPr>
             <a:r>
               <a:rPr/>
-              <a:t>Ask the participants to write down 2-3 bullet points that describe what is will be like when the problem has been </a:t>
-            </a:r>
-            <a:r>
-              <a:rPr b="1"/>
-              <a:t>fully</a:t>
-            </a:r>
-            <a:r>
-              <a:rPr/>
-              <a:t> solved</a:t>
-            </a:r>
-          </a:p>
-          <a:p>
-            <a:pPr lvl="1"/>
-            <a:r>
-              <a:rPr/>
-              <a:t>Write the notes individually without discussion and without showing them</a:t>
-            </a:r>
-          </a:p>
-          <a:p>
-            <a:pPr lvl="1"/>
-            <a:r>
-              <a:rPr/>
-              <a:t>This should be idealistic, not realistic or pragmatic (we will add that later)</a:t>
-            </a:r>
-          </a:p>
-          <a:p>
-            <a:pPr lvl="1"/>
-            <a:r>
-              <a:rPr/>
-              <a:t>Do not think about solutions</a:t>
+              <a:t>The Facilitator is in charge</a:t>
             </a:r>
           </a:p>
           <a:p>
@@ -3780,7 +3486,7 @@
             </a:pPr>
             <a:r>
               <a:rPr/>
-              <a:t>All participants show their notes at the same time</a:t>
+              <a:t>Challenge owner makes decisions</a:t>
             </a:r>
           </a:p>
           <a:p>
@@ -3789,7 +3495,21 @@
             </a:pPr>
             <a:r>
               <a:rPr/>
-              <a:t>The facilitator talks through each note in turn</a:t>
+              <a:t>No distractions from phones or emails or chat</a:t>
+            </a:r>
+          </a:p>
+          <a:p>
+            <a:pPr lvl="1"/>
+            <a:r>
+              <a:rPr/>
+              <a:t>switch off notifications</a:t>
+            </a:r>
+          </a:p>
+          <a:p>
+            <a:pPr lvl="1"/>
+            <a:r>
+              <a:rPr/>
+              <a:t>we will have breaks</a:t>
             </a:r>
           </a:p>
           <a:p>
@@ -3798,141 +3518,28 @@
             </a:pPr>
             <a:r>
               <a:rPr/>
-              <a:t>The facilitator creates a summary note that captures the agreement and divergence of the team’s contributions</a:t>
-            </a:r>
-          </a:p>
-          <a:p>
-            <a:pPr lvl="0" indent="-342900" marL="342900">
-              <a:buAutoNum type="arabicPeriod"/>
-            </a:pPr>
-            <a:r>
-              <a:rPr/>
-              <a:t>The facilitator asks for any further thoughts from the team and adds to the summary if necessary</a:t>
-            </a:r>
-          </a:p>
-          <a:p>
-            <a:pPr lvl="0" indent="-342900" marL="342900">
-              <a:buAutoNum type="arabicPeriod"/>
-            </a:pPr>
-            <a:r>
-              <a:rPr/>
-              <a:t>The facilitator then leads an analysis of the summary to firm up what an </a:t>
-            </a:r>
-            <a:r>
-              <a:rPr b="1"/>
-              <a:t>ambitious</a:t>
-            </a:r>
-            <a:r>
-              <a:rPr/>
-              <a:t> view of success looks like and resolve any disagreements.</a:t>
-            </a:r>
-          </a:p>
-          <a:p>
-            <a:pPr lvl="0" indent="-342900" marL="342900">
-              <a:buAutoNum type="arabicPeriod"/>
-            </a:pPr>
-            <a:r>
-              <a:rPr/>
-              <a:t>The next step is to make sure that we know when we have achieved success, is it </a:t>
-            </a:r>
-            <a:r>
-              <a:rPr b="1"/>
-              <a:t>measureable</a:t>
-            </a:r>
-            <a:r>
-              <a:rPr/>
-              <a:t>? The following questions can be used as a start point -</a:t>
-            </a:r>
-          </a:p>
-          <a:p>
-            <a:pPr lvl="1"/>
-            <a:r>
-              <a:rPr/>
-              <a:t>What objective measures can we use to confirm that we have achieved success?</a:t>
-            </a:r>
-          </a:p>
-          <a:p>
-            <a:pPr lvl="1"/>
-            <a:r>
-              <a:rPr/>
-              <a:t>What measures can we use to help us understand that we are on track to deliver success</a:t>
-            </a:r>
-          </a:p>
-          <a:p>
-            <a:pPr lvl="1"/>
-            <a:r>
-              <a:rPr/>
-              <a:t>How does this change our definition of success?</a:t>
-            </a:r>
-          </a:p>
-          <a:p>
-            <a:pPr lvl="1"/>
-            <a:r>
-              <a:rPr/>
-              <a:t>Is it still </a:t>
-            </a:r>
-            <a:r>
-              <a:rPr b="1"/>
-              <a:t>significant</a:t>
-            </a:r>
-            <a:r>
-              <a:rPr/>
-              <a:t> and </a:t>
-            </a:r>
-            <a:r>
-              <a:rPr b="1"/>
-              <a:t>ambitious</a:t>
-            </a:r>
-            <a:r>
-              <a:rPr/>
-              <a:t>?​</a:t>
-            </a:r>
-          </a:p>
-          <a:p>
-            <a:pPr lvl="0" indent="-342900" marL="342900">
-              <a:buAutoNum type="arabicPeriod"/>
-            </a:pPr>
-            <a:r>
-              <a:rPr/>
-              <a:t>We now have a view of success, a target state that is</a:t>
-            </a:r>
-          </a:p>
-          <a:p>
-            <a:pPr lvl="1" indent="0" marL="342900">
-              <a:buNone/>
-            </a:pPr>
-            <a:r>
-              <a:rPr b="1"/>
-              <a:t>S</a:t>
-            </a:r>
-            <a:r>
-              <a:rPr/>
-              <a:t>ignificant </a:t>
-            </a:r>
-            <a:r>
-              <a:rPr b="1"/>
-              <a:t>M</a:t>
-            </a:r>
-            <a:r>
-              <a:rPr/>
-              <a:t>easureable </a:t>
-            </a:r>
-            <a:r>
-              <a:rPr b="1"/>
-              <a:t>A</a:t>
-            </a:r>
-            <a:r>
-              <a:rPr/>
-              <a:t>mbitious</a:t>
-            </a:r>
-          </a:p>
-          <a:p>
-            <a:pPr lvl="0" indent="0" marL="0">
-              <a:buNone/>
-            </a:pPr>
-            <a:r>
-              <a:rPr/>
-              <a:t>Now it’s time to take another short break!</a:t>
+              <a:t>Don’t worry about children, pets, partners, deliveries, builders, etc</a:t>
+            </a:r>
+          </a:p>
+          <a:p>
+            <a:pPr lvl="1"/>
+            <a:r>
+              <a:rPr/>
+              <a:t>they will interrupt and distract, it is OK!</a:t>
+            </a:r>
+          </a:p>
+          <a:p>
+            <a:pPr lvl="1"/>
+            <a:r>
+              <a:rPr/>
+              <a:t>this is normal!</a:t>
+            </a:r>
+          </a:p>
+          <a:p>
+            <a:pPr lvl="1"/>
+            <a:r>
+              <a:rPr/>
+              <a:t>sometimes they help with the creativity…</a:t>
             </a:r>
           </a:p>
         </p:txBody>
@@ -3979,7 +3586,7 @@
             </a:pPr>
             <a:r>
               <a:rPr/>
-              <a:t>Route to Value</a:t>
+              <a:t>Workshop Agenda</a:t>
             </a:r>
           </a:p>
         </p:txBody>
@@ -3998,6 +3605,60 @@
         <p:txBody>
           <a:bodyPr/>
           <a:lstStyle/>
+          <a:p>
+            <a:pPr lvl="0" indent="-342900" marL="342900">
+              <a:buAutoNum type="arabicPeriod"/>
+            </a:pPr>
+            <a:r>
+              <a:rPr/>
+              <a:t>The challenge (15 - 20 minutes)</a:t>
+            </a:r>
+          </a:p>
+          <a:p>
+            <a:pPr lvl="0" indent="-342900" marL="342900">
+              <a:buAutoNum type="arabicPeriod"/>
+            </a:pPr>
+            <a:r>
+              <a:rPr/>
+              <a:t>Problem identification (60 - 90 minutes)</a:t>
+            </a:r>
+          </a:p>
+          <a:p>
+            <a:pPr lvl="0" indent="-342900" marL="342900">
+              <a:buAutoNum type="arabicPeriod"/>
+            </a:pPr>
+            <a:r>
+              <a:rPr/>
+              <a:t>Defining success (45 - 60 minutes)</a:t>
+            </a:r>
+          </a:p>
+          <a:p>
+            <a:pPr lvl="0" indent="-342900" marL="342900">
+              <a:buAutoNum type="arabicPeriod"/>
+            </a:pPr>
+            <a:r>
+              <a:rPr/>
+              <a:t>Route to value (45 - 60 minutes)</a:t>
+            </a:r>
+          </a:p>
+          <a:p>
+            <a:pPr lvl="0" indent="-342900" marL="342900">
+              <a:buAutoNum type="arabicPeriod"/>
+            </a:pPr>
+            <a:r>
+              <a:rPr/>
+              <a:t>Key stakeholders (45 - 60 minutes)</a:t>
+            </a:r>
+          </a:p>
+          <a:p>
+            <a:pPr lvl="0" indent="-342900" marL="342900">
+              <a:buAutoNum type="arabicPeriod"/>
+            </a:pPr>
+            <a:r>
+              <a:rPr/>
+              <a:t>Decisions (10 - 20 minutes)</a:t>
+            </a:r>
+          </a:p>
           <a:p>
             <a:pPr lvl="0" indent="0" marL="0">
               <a:spcBef>
@@ -4007,261 +3668,7 @@
             </a:pPr>
             <a:r>
               <a:rPr b="1"/>
-              <a:t>Purpose - we will establish a realistic way forward</a:t>
-            </a:r>
-          </a:p>
-          <a:p>
-            <a:pPr lvl="0" indent="0" marL="0">
-              <a:spcBef>
-                <a:spcPts val="3000"/>
-              </a:spcBef>
-              <a:buNone/>
-            </a:pPr>
-            <a:r>
-              <a:rPr b="1"/>
-              <a:t>Duration - 45 minutes</a:t>
-            </a:r>
-          </a:p>
-          <a:p>
-            <a:pPr lvl="0" indent="-342900" marL="342900">
-              <a:buAutoNum type="arabicPeriod"/>
-            </a:pPr>
-            <a:r>
-              <a:rPr/>
-              <a:t>Ask the participants to write down about 10 bullet points that describe how success can be delivered</a:t>
-            </a:r>
-          </a:p>
-          <a:p>
-            <a:pPr lvl="1"/>
-            <a:r>
-              <a:rPr/>
-              <a:t>Write the notes individually without discussion and without showing them</a:t>
-            </a:r>
-          </a:p>
-          <a:p>
-            <a:pPr lvl="1"/>
-            <a:r>
-              <a:rPr/>
-              <a:t>If you have any solution options, list them now, we are capturing them to sho wthat there are possible ways forward (we will not discuss them in detail in this workshop)</a:t>
-            </a:r>
-          </a:p>
-          <a:p>
-            <a:pPr lvl="1"/>
-            <a:r>
-              <a:rPr/>
-              <a:t>This should be idealistic, not realistic or pragmatic (we will add that later)</a:t>
-            </a:r>
-          </a:p>
-          <a:p>
-            <a:pPr lvl="0" indent="-342900" marL="342900">
-              <a:buAutoNum type="arabicPeriod"/>
-            </a:pPr>
-            <a:r>
-              <a:rPr/>
-              <a:t>All participants show their notes at the same time</a:t>
-            </a:r>
-          </a:p>
-          <a:p>
-            <a:pPr lvl="0" indent="-342900" marL="342900">
-              <a:buAutoNum type="arabicPeriod"/>
-            </a:pPr>
-            <a:r>
-              <a:rPr/>
-              <a:t>The facilitator talks through each note in turn</a:t>
-            </a:r>
-          </a:p>
-          <a:p>
-            <a:pPr lvl="0" indent="-342900" marL="342900">
-              <a:buAutoNum type="arabicPeriod"/>
-            </a:pPr>
-            <a:r>
-              <a:rPr/>
-              <a:t>The facilitator creates a summary note that captures the agreement and divergence of the team’s contributions</a:t>
-            </a:r>
-          </a:p>
-          <a:p>
-            <a:pPr lvl="0" indent="-342900" marL="342900">
-              <a:buAutoNum type="arabicPeriod"/>
-            </a:pPr>
-            <a:r>
-              <a:rPr/>
-              <a:t>The facilitator asks for any further thoughts from the team and adds to the summary if necessary</a:t>
-            </a:r>
-          </a:p>
-          <a:p>
-            <a:pPr lvl="0" indent="-342900" marL="342900">
-              <a:buAutoNum type="arabicPeriod"/>
-            </a:pPr>
-            <a:r>
-              <a:rPr/>
-              <a:t>The facilitator then leads an analysis of the summary to firm up the route to value and resolve any disagreements.</a:t>
-            </a:r>
-          </a:p>
-          <a:p>
-            <a:pPr lvl="0" indent="-342900" marL="342900">
-              <a:buAutoNum type="arabicPeriod"/>
-            </a:pPr>
-            <a:r>
-              <a:rPr/>
-              <a:t>The next step is to adjust our route to make sure that we being </a:t>
-            </a:r>
-            <a:r>
-              <a:rPr b="1"/>
-              <a:t>realistic</a:t>
-            </a:r>
-            <a:r>
-              <a:rPr/>
-              <a:t>. The following questions can be used as a start point</a:t>
-            </a:r>
-          </a:p>
-          <a:p>
-            <a:pPr lvl="1"/>
-            <a:r>
-              <a:rPr/>
-              <a:t>What is the maximum that should be paid to solve this problem​?</a:t>
-            </a:r>
-          </a:p>
-          <a:p>
-            <a:pPr lvl="1"/>
-            <a:r>
-              <a:rPr/>
-              <a:t>What are the major steps required to deliver the ideal​?</a:t>
-            </a:r>
-          </a:p>
-          <a:p>
-            <a:pPr lvl="1"/>
-            <a:r>
-              <a:rPr/>
-              <a:t>Can these be delivered?</a:t>
-            </a:r>
-          </a:p>
-          <a:p>
-            <a:pPr lvl="1"/>
-            <a:r>
-              <a:rPr/>
-              <a:t>Can the ideal be delivered in phases?</a:t>
-            </a:r>
-          </a:p>
-          <a:p>
-            <a:pPr lvl="1"/>
-            <a:r>
-              <a:rPr/>
-              <a:t>Is there a point before we get to the ideal that is “good enough”?</a:t>
-            </a:r>
-          </a:p>
-          <a:p>
-            <a:pPr lvl="1"/>
-            <a:r>
-              <a:rPr/>
-              <a:t>What are the big risks, issues, blockers, concerns, constraints​ that may stop us achieving the ideal?</a:t>
-            </a:r>
-          </a:p>
-          <a:p>
-            <a:pPr lvl="1"/>
-            <a:r>
-              <a:rPr/>
-              <a:t>Are any critical details that could derail us​?</a:t>
-            </a:r>
-          </a:p>
-          <a:p>
-            <a:pPr lvl="1"/>
-            <a:r>
-              <a:rPr/>
-              <a:t>How does this change our definition of success?</a:t>
-            </a:r>
-          </a:p>
-          <a:p>
-            <a:pPr lvl="1"/>
-            <a:r>
-              <a:rPr/>
-              <a:t>Is it still </a:t>
-            </a:r>
-            <a:r>
-              <a:rPr b="1"/>
-              <a:t>significant</a:t>
-            </a:r>
-            <a:r>
-              <a:rPr/>
-              <a:t>, </a:t>
-            </a:r>
-            <a:r>
-              <a:rPr b="1"/>
-              <a:t>measureable</a:t>
-            </a:r>
-            <a:r>
-              <a:rPr/>
-              <a:t> and </a:t>
-            </a:r>
-            <a:r>
-              <a:rPr b="1"/>
-              <a:t>ambitious</a:t>
-            </a:r>
-            <a:r>
-              <a:rPr/>
-              <a:t>?​</a:t>
-            </a:r>
-          </a:p>
-          <a:p>
-            <a:pPr lvl="0" indent="-342900" marL="342900">
-              <a:buAutoNum type="arabicPeriod"/>
-            </a:pPr>
-            <a:r>
-              <a:rPr/>
-              <a:t>We now have a view of success, a target state that is</a:t>
-            </a:r>
-          </a:p>
-          <a:p>
-            <a:pPr lvl="1" indent="0" marL="342900">
-              <a:buNone/>
-            </a:pPr>
-            <a:r>
-              <a:rPr b="1"/>
-              <a:t>S</a:t>
-            </a:r>
-            <a:r>
-              <a:rPr/>
-              <a:t>ignificant </a:t>
-            </a:r>
-            <a:r>
-              <a:rPr b="1"/>
-              <a:t>M</a:t>
-            </a:r>
-            <a:r>
-              <a:rPr/>
-              <a:t>easureable </a:t>
-            </a:r>
-            <a:r>
-              <a:rPr b="1"/>
-              <a:t>A</a:t>
-            </a:r>
-            <a:r>
-              <a:rPr/>
-              <a:t>mbitious </a:t>
-            </a:r>
-            <a:r>
-              <a:rPr b="1"/>
-              <a:t>R</a:t>
-            </a:r>
-            <a:r>
-              <a:rPr/>
-              <a:t>ealistic </a:t>
-            </a:r>
-            <a:r>
-              <a:rPr b="1"/>
-              <a:t>T</a:t>
-            </a:r>
-            <a:r>
-              <a:rPr/>
-              <a:t>imebound</a:t>
-            </a:r>
-          </a:p>
-          <a:p>
-            <a:pPr lvl="0" indent="0" marL="0">
-              <a:buNone/>
-            </a:pPr>
-            <a:r>
-              <a:rPr/>
-              <a:t>Now we should have another short break!</a:t>
+              <a:t>Total duration - 4 to 6 hours (including breaks)</a:t>
             </a:r>
           </a:p>
         </p:txBody>
@@ -4308,7 +3715,7 @@
             </a:pPr>
             <a:r>
               <a:rPr/>
-              <a:t>Stakeholders</a:t>
+              <a:t>Introduction</a:t>
             </a:r>
           </a:p>
         </p:txBody>
@@ -4336,28 +3743,111 @@
             </a:pPr>
             <a:r>
               <a:rPr b="1"/>
-              <a:t>Purpose -</a:t>
-            </a:r>
-          </a:p>
-          <a:p>
-            <a:pPr lvl="0" indent="0" marL="0">
-              <a:spcBef>
-                <a:spcPts val="3000"/>
-              </a:spcBef>
-              <a:buNone/>
-            </a:pPr>
-            <a:r>
-              <a:rPr b="1"/>
-              <a:t>Duration - 45 minutes</a:t>
-            </a:r>
-          </a:p>
-          <a:p>
-            <a:pPr lvl="0" indent="0" marL="0">
-              <a:buNone/>
-            </a:pPr>
-            <a:r>
-              <a:rPr/>
-              <a:t>who pays​ who cares​ who can cause problems​ who needs to support​ who do we need to persuade to back us​</a:t>
+              <a:t>Purpose - explain the purpose of the workshop</a:t>
+            </a:r>
+          </a:p>
+          <a:p>
+            <a:pPr lvl="0" indent="-342900" marL="342900">
+              <a:buAutoNum type="arabicPeriod"/>
+            </a:pPr>
+            <a:r>
+              <a:rPr/>
+              <a:t>Introduction</a:t>
+            </a:r>
+          </a:p>
+          <a:p>
+            <a:pPr lvl="1"/>
+            <a:r>
+              <a:rPr/>
+              <a:t>We are here to discuss [the challenge]</a:t>
+            </a:r>
+          </a:p>
+          <a:p>
+            <a:pPr lvl="1"/>
+            <a:r>
+              <a:rPr/>
+              <a:t>The purpose of this workshop is to</a:t>
+            </a:r>
+          </a:p>
+          <a:p>
+            <a:pPr lvl="2"/>
+            <a:r>
+              <a:rPr/>
+              <a:t>Clearly define the problem​</a:t>
+            </a:r>
+          </a:p>
+          <a:p>
+            <a:pPr lvl="2"/>
+            <a:r>
+              <a:rPr/>
+              <a:t>Understand what successful resolution looks like​</a:t>
+            </a:r>
+          </a:p>
+          <a:p>
+            <a:pPr lvl="2"/>
+            <a:r>
+              <a:rPr/>
+              <a:t>Identify the key stakeholders who must commit to delivering success​</a:t>
+            </a:r>
+          </a:p>
+          <a:p>
+            <a:pPr lvl="2"/>
+            <a:r>
+              <a:rPr/>
+              <a:t>Determine the of enterprise architecture</a:t>
+            </a:r>
+          </a:p>
+          <a:p>
+            <a:pPr lvl="0" indent="-342900" marL="342900">
+              <a:buAutoNum type="arabicPeriod"/>
+            </a:pPr>
+            <a:r>
+              <a:rPr/>
+              <a:t>Quick personal introductions if everyone does not know each other</a:t>
+            </a:r>
+          </a:p>
+          <a:p>
+            <a:pPr lvl="1"/>
+            <a:r>
+              <a:rPr/>
+              <a:t>name</a:t>
+            </a:r>
+          </a:p>
+          <a:p>
+            <a:pPr lvl="1"/>
+            <a:r>
+              <a:rPr/>
+              <a:t>2 words describing what you do</a:t>
+            </a:r>
+          </a:p>
+          <a:p>
+            <a:pPr lvl="0" indent="-342900" marL="342900">
+              <a:buAutoNum type="arabicPeriod"/>
+            </a:pPr>
+            <a:r>
+              <a:rPr/>
+              <a:t>The challenge</a:t>
+            </a:r>
+          </a:p>
+          <a:p>
+            <a:pPr lvl="1"/>
+            <a:r>
+              <a:rPr/>
+              <a:t>[challenge owner] will now set the scene for the workshop by briefly describing the challenge*</a:t>
+            </a:r>
+          </a:p>
+          <a:p>
+            <a:pPr lvl="1"/>
+            <a:r>
+              <a:rPr/>
+              <a:t>The challenge that we see is [challenge description]*</a:t>
+            </a:r>
+          </a:p>
+          <a:p>
+            <a:pPr lvl="1"/>
+            <a:r>
+              <a:rPr/>
+              <a:t>We don’t have strong evidence but the impact that we see anecdotally is [examples]*</a:t>
             </a:r>
           </a:p>
         </p:txBody>
@@ -4404,7 +3894,7 @@
             </a:pPr>
             <a:r>
               <a:rPr/>
-              <a:t>Decisions</a:t>
+              <a:t>Problem Identification</a:t>
             </a:r>
           </a:p>
         </p:txBody>
@@ -4424,36 +3914,76 @@
           <a:bodyPr/>
           <a:lstStyle/>
           <a:p>
-            <a:pPr lvl="0" indent="0" marL="0">
-              <a:spcBef>
-                <a:spcPts val="3000"/>
-              </a:spcBef>
-              <a:buNone/>
-            </a:pPr>
-            <a:r>
-              <a:rPr b="1"/>
-              <a:t>Purpose -</a:t>
-            </a:r>
-          </a:p>
-          <a:p>
-            <a:pPr lvl="0" indent="0" marL="0">
-              <a:spcBef>
-                <a:spcPts val="3000"/>
-              </a:spcBef>
-              <a:buNone/>
-            </a:pPr>
-            <a:r>
-              <a:rPr b="1"/>
-              <a:t>Duration - 10 minutes</a:t>
-            </a:r>
-          </a:p>
-          <a:p>
-            <a:pPr lvl="0" indent="0" marL="0">
-              <a:buNone/>
-            </a:pPr>
-            <a:r>
-              <a:rPr/>
-              <a:t>go / no go - should we look for solutions?​ who will plan next steps and when​ is there a role for enterprise architects</a:t>
+            <a:pPr lvl="0" indent="-342900" marL="342900">
+              <a:buAutoNum type="arabicPeriod"/>
+            </a:pPr>
+            <a:r>
+              <a:rPr/>
+              <a:t>Ask the participants to write down 2-3 bullet points that describe their perspective on the challenge</a:t>
+            </a:r>
+          </a:p>
+          <a:p>
+            <a:pPr lvl="1"/>
+            <a:r>
+              <a:rPr/>
+              <a:t>Write the notes individually without discussion and without showing them</a:t>
+            </a:r>
+          </a:p>
+          <a:p>
+            <a:pPr lvl="1"/>
+            <a:r>
+              <a:rPr/>
+              <a:t>What is the root cause?</a:t>
+            </a:r>
+          </a:p>
+          <a:p>
+            <a:pPr lvl="1"/>
+            <a:r>
+              <a:rPr/>
+              <a:t>Why is it important to address the challenge?</a:t>
+            </a:r>
+          </a:p>
+          <a:p>
+            <a:pPr lvl="1"/>
+            <a:r>
+              <a:rPr/>
+              <a:t>Do not think about solutions</a:t>
+            </a:r>
+          </a:p>
+          <a:p>
+            <a:pPr lvl="0" indent="-342900" marL="342900">
+              <a:buAutoNum type="arabicPeriod"/>
+            </a:pPr>
+            <a:r>
+              <a:rPr/>
+              <a:t>All participants show their notes at the same time</a:t>
+            </a:r>
+          </a:p>
+          <a:p>
+            <a:pPr lvl="0" indent="-342900" marL="342900">
+              <a:buAutoNum type="arabicPeriod"/>
+            </a:pPr>
+            <a:r>
+              <a:rPr/>
+              <a:t>The facilitator talks through each note in turn</a:t>
+            </a:r>
+          </a:p>
+          <a:p>
+            <a:pPr lvl="0" indent="-342900" marL="342900">
+              <a:buAutoNum type="arabicPeriod"/>
+            </a:pPr>
+            <a:r>
+              <a:rPr/>
+              <a:t>The facilitator creates a summary note that captures the agreement and divergence of the team’s contributions</a:t>
+            </a:r>
+          </a:p>
+          <a:p>
+            <a:pPr lvl="0" indent="-342900" marL="342900">
+              <a:buAutoNum type="arabicPeriod"/>
+            </a:pPr>
+            <a:r>
+              <a:rPr/>
+              <a:t>The facilitator asks for any further thoughts from the team and adds to the summary if necessary</a:t>
             </a:r>
           </a:p>
         </p:txBody>
@@ -4500,7 +4030,135 @@
             </a:pPr>
             <a:r>
               <a:rPr/>
-              <a:t>Architecture Challenge Canvas</a:t>
+              <a:t>Problem Analysis</a:t>
+            </a:r>
+          </a:p>
+        </p:txBody>
+      </p:sp>
+      <p:sp>
+        <p:nvSpPr>
+          <p:cNvPr id="3" name="Content Placeholder 2"/>
+          <p:cNvSpPr>
+            <a:spLocks noGrp="1"/>
+          </p:cNvSpPr>
+          <p:nvPr>
+            <p:ph idx="1"/>
+          </p:nvPr>
+        </p:nvSpPr>
+        <p:spPr/>
+        <p:txBody>
+          <a:bodyPr/>
+          <a:lstStyle/>
+          <a:p>
+            <a:pPr lvl="0" indent="-342900" marL="342900">
+              <a:buAutoNum type="arabicPeriod"/>
+            </a:pPr>
+            <a:r>
+              <a:rPr/>
+              <a:t>The facilitator then leads an analysis of the summary to firm up the problem description and resolve any disagreements. The following questions can be used as a start point -</a:t>
+            </a:r>
+          </a:p>
+          <a:p>
+            <a:pPr lvl="1"/>
+            <a:r>
+              <a:rPr/>
+              <a:t>How does this damage the business?​</a:t>
+            </a:r>
+          </a:p>
+          <a:p>
+            <a:pPr lvl="1"/>
+            <a:r>
+              <a:rPr/>
+              <a:t>Will key business stakeholders recognise the problem?</a:t>
+            </a:r>
+          </a:p>
+          <a:p>
+            <a:pPr lvl="1"/>
+            <a:r>
+              <a:rPr/>
+              <a:t>What makes it </a:t>
+            </a:r>
+            <a:r>
+              <a:rPr b="1"/>
+              <a:t>significant</a:t>
+            </a:r>
+            <a:r>
+              <a:rPr/>
+              <a:t>​ to the business stakeholders?</a:t>
+            </a:r>
+          </a:p>
+          <a:p>
+            <a:pPr lvl="1"/>
+            <a:r>
+              <a:rPr/>
+              <a:t>What makes it important to do something now?​</a:t>
+            </a:r>
+          </a:p>
+          <a:p>
+            <a:pPr lvl="1"/>
+            <a:r>
+              <a:rPr/>
+              <a:t>What value will enterprise architects bring to the challenge?</a:t>
+            </a:r>
+          </a:p>
+          <a:p>
+            <a:pPr lvl="0" indent="-342900" marL="342900">
+              <a:buAutoNum type="arabicPeriod"/>
+            </a:pPr>
+            <a:r>
+              <a:rPr/>
+              <a:t>The facilitator summarises the discussion under the following headings -</a:t>
+            </a:r>
+          </a:p>
+          <a:p>
+            <a:pPr lvl="1"/>
+            <a:r>
+              <a:rPr/>
+              <a:t>Problem statement highlighting the negative impact on the business</a:t>
+            </a:r>
+          </a:p>
+          <a:p>
+            <a:pPr lvl="1"/>
+            <a:r>
+              <a:rPr/>
+              <a:t>Who is impacted negatively by the problem?</a:t>
+            </a:r>
+          </a:p>
+          <a:p>
+            <a:pPr lvl="1"/>
+            <a:r>
+              <a:rPr/>
+              <a:t>Who benefits from the problem?</a:t>
+            </a:r>
+          </a:p>
+          <a:p>
+            <a:pPr lvl="1"/>
+            <a:r>
+              <a:rPr/>
+              <a:t>Why is is important now?</a:t>
+            </a:r>
+          </a:p>
+          <a:p>
+            <a:pPr lvl="1"/>
+            <a:r>
+              <a:rPr/>
+              <a:t>What important things don’t we know?</a:t>
+            </a:r>
+          </a:p>
+          <a:p>
+            <a:pPr lvl="1"/>
+            <a:r>
+              <a:rPr/>
+              <a:t>How can enterprise architects help?</a:t>
+            </a:r>
+          </a:p>
+          <a:p>
+            <a:pPr lvl="0" indent="0" marL="0">
+              <a:buNone/>
+            </a:pPr>
+            <a:r>
+              <a:rPr/>
+              <a:t>Now it’s time to take a short break!</a:t>
             </a:r>
           </a:p>
         </p:txBody>
@@ -4547,7 +4205,414 @@
             </a:pPr>
             <a:r>
               <a:rPr/>
-              <a:t>Example</a:t>
+              <a:t>Success Description</a:t>
+            </a:r>
+          </a:p>
+        </p:txBody>
+      </p:sp>
+      <p:sp>
+        <p:nvSpPr>
+          <p:cNvPr id="3" name="Content Placeholder 2"/>
+          <p:cNvSpPr>
+            <a:spLocks noGrp="1"/>
+          </p:cNvSpPr>
+          <p:nvPr>
+            <p:ph idx="1"/>
+          </p:nvPr>
+        </p:nvSpPr>
+        <p:spPr/>
+        <p:txBody>
+          <a:bodyPr/>
+          <a:lstStyle/>
+          <a:p>
+            <a:pPr lvl="0" indent="-342900" marL="342900">
+              <a:buAutoNum type="arabicPeriod"/>
+            </a:pPr>
+            <a:r>
+              <a:rPr/>
+              <a:t>Ask the participants to write down 2-3 bullet points that describe what is will be like when the problem has been </a:t>
+            </a:r>
+            <a:r>
+              <a:rPr b="1"/>
+              <a:t>fully</a:t>
+            </a:r>
+            <a:r>
+              <a:rPr/>
+              <a:t> solved</a:t>
+            </a:r>
+          </a:p>
+          <a:p>
+            <a:pPr lvl="1"/>
+            <a:r>
+              <a:rPr/>
+              <a:t>Write the notes individually without discussion and without showing them</a:t>
+            </a:r>
+          </a:p>
+          <a:p>
+            <a:pPr lvl="1"/>
+            <a:r>
+              <a:rPr/>
+              <a:t>This should be idealistic, not realistic or pragmatic (we will add that later)</a:t>
+            </a:r>
+          </a:p>
+          <a:p>
+            <a:pPr lvl="1"/>
+            <a:r>
+              <a:rPr/>
+              <a:t>Do not think about solutions</a:t>
+            </a:r>
+          </a:p>
+          <a:p>
+            <a:pPr lvl="0" indent="-342900" marL="342900">
+              <a:buAutoNum type="arabicPeriod"/>
+            </a:pPr>
+            <a:r>
+              <a:rPr/>
+              <a:t>All participants show their notes at the same time</a:t>
+            </a:r>
+          </a:p>
+          <a:p>
+            <a:pPr lvl="0" indent="-342900" marL="342900">
+              <a:buAutoNum type="arabicPeriod"/>
+            </a:pPr>
+            <a:r>
+              <a:rPr/>
+              <a:t>The facilitator talks through each note in turn</a:t>
+            </a:r>
+          </a:p>
+          <a:p>
+            <a:pPr lvl="0" indent="-342900" marL="342900">
+              <a:buAutoNum type="arabicPeriod"/>
+            </a:pPr>
+            <a:r>
+              <a:rPr/>
+              <a:t>The facilitator creates a summary note that captures the agreement and divergence of the team’s contributions</a:t>
+            </a:r>
+          </a:p>
+          <a:p>
+            <a:pPr lvl="0" indent="-342900" marL="342900">
+              <a:buAutoNum type="arabicPeriod"/>
+            </a:pPr>
+            <a:r>
+              <a:rPr/>
+              <a:t>The facilitator asks for any further thoughts from the team and adds to the summary if necessary</a:t>
+            </a:r>
+          </a:p>
+        </p:txBody>
+      </p:sp>
+    </p:spTree>
+  </p:cSld>
+</p:sld>
+</file>
+
+<file path=ppt/slides/slide18.xml><?xml version="1.0" encoding="utf-8"?>
+<p:sld xmlns:a="http://schemas.openxmlformats.org/drawingml/2006/main" xmlns:r="http://schemas.openxmlformats.org/officeDocument/2006/relationships" xmlns:p="http://schemas.openxmlformats.org/presentationml/2006/main">
+  <p:cSld>
+    <p:spTree>
+      <p:nvGrpSpPr>
+        <p:cNvPr id="1" name=""/>
+        <p:cNvGrpSpPr/>
+        <p:nvPr/>
+      </p:nvGrpSpPr>
+      <p:grpSpPr>
+        <a:xfrm>
+          <a:off x="0" y="0"/>
+          <a:ext cx="0" cy="0"/>
+          <a:chOff x="0" y="0"/>
+          <a:chExt cx="0" cy="0"/>
+        </a:xfrm>
+      </p:grpSpPr>
+      <p:sp>
+        <p:nvSpPr>
+          <p:cNvPr id="2" name="Title 1"/>
+          <p:cNvSpPr>
+            <a:spLocks noGrp="1"/>
+          </p:cNvSpPr>
+          <p:nvPr>
+            <p:ph type="title"/>
+          </p:nvPr>
+        </p:nvSpPr>
+        <p:spPr/>
+        <p:txBody>
+          <a:bodyPr/>
+          <a:lstStyle/>
+          <a:p>
+            <a:pPr lvl="0" indent="0" marL="0">
+              <a:buNone/>
+            </a:pPr>
+            <a:r>
+              <a:rPr/>
+              <a:t>Success Analysis</a:t>
+            </a:r>
+          </a:p>
+        </p:txBody>
+      </p:sp>
+      <p:sp>
+        <p:nvSpPr>
+          <p:cNvPr id="3" name="Content Placeholder 2"/>
+          <p:cNvSpPr>
+            <a:spLocks noGrp="1"/>
+          </p:cNvSpPr>
+          <p:nvPr>
+            <p:ph idx="1"/>
+          </p:nvPr>
+        </p:nvSpPr>
+        <p:spPr/>
+        <p:txBody>
+          <a:bodyPr/>
+          <a:lstStyle/>
+          <a:p>
+            <a:pPr lvl="0" indent="-342900" marL="342900">
+              <a:buAutoNum type="arabicPeriod"/>
+            </a:pPr>
+            <a:r>
+              <a:rPr/>
+              <a:t>The facilitator then leads an analysis of the summary to firm up what an </a:t>
+            </a:r>
+            <a:r>
+              <a:rPr b="1"/>
+              <a:t>ambitious</a:t>
+            </a:r>
+            <a:r>
+              <a:rPr/>
+              <a:t> view of success looks like and resolve any disagreements.</a:t>
+            </a:r>
+          </a:p>
+          <a:p>
+            <a:pPr lvl="0" indent="-342900" marL="342900">
+              <a:buAutoNum type="arabicPeriod"/>
+            </a:pPr>
+            <a:r>
+              <a:rPr/>
+              <a:t>The next step is to make sure that we know when we have achieved success, is it </a:t>
+            </a:r>
+            <a:r>
+              <a:rPr b="1"/>
+              <a:t>measureable</a:t>
+            </a:r>
+            <a:r>
+              <a:rPr/>
+              <a:t>? The following questions can be used as a start point -</a:t>
+            </a:r>
+          </a:p>
+          <a:p>
+            <a:pPr lvl="1"/>
+            <a:r>
+              <a:rPr/>
+              <a:t>What objective measures can we use to confirm that we have achieved success?</a:t>
+            </a:r>
+          </a:p>
+          <a:p>
+            <a:pPr lvl="1"/>
+            <a:r>
+              <a:rPr/>
+              <a:t>What measures can we use to help us understand that we are on track to deliver success</a:t>
+            </a:r>
+          </a:p>
+          <a:p>
+            <a:pPr lvl="1"/>
+            <a:r>
+              <a:rPr/>
+              <a:t>How does this change our definition of success?</a:t>
+            </a:r>
+          </a:p>
+          <a:p>
+            <a:pPr lvl="1"/>
+            <a:r>
+              <a:rPr/>
+              <a:t>Is it still </a:t>
+            </a:r>
+            <a:r>
+              <a:rPr b="1"/>
+              <a:t>significant</a:t>
+            </a:r>
+            <a:r>
+              <a:rPr/>
+              <a:t> and </a:t>
+            </a:r>
+            <a:r>
+              <a:rPr b="1"/>
+              <a:t>ambitious</a:t>
+            </a:r>
+            <a:r>
+              <a:rPr/>
+              <a:t>?​</a:t>
+            </a:r>
+          </a:p>
+          <a:p>
+            <a:pPr lvl="0" indent="-342900" marL="342900">
+              <a:buAutoNum type="arabicPeriod"/>
+            </a:pPr>
+            <a:r>
+              <a:rPr/>
+              <a:t>We now have a view of success, a target state that is</a:t>
+            </a:r>
+          </a:p>
+          <a:p>
+            <a:pPr lvl="1" indent="0" marL="342900">
+              <a:buNone/>
+            </a:pPr>
+            <a:r>
+              <a:rPr b="1"/>
+              <a:t>S</a:t>
+            </a:r>
+            <a:r>
+              <a:rPr/>
+              <a:t>ignificant </a:t>
+            </a:r>
+            <a:r>
+              <a:rPr b="1"/>
+              <a:t>M</a:t>
+            </a:r>
+            <a:r>
+              <a:rPr/>
+              <a:t>easureable </a:t>
+            </a:r>
+            <a:r>
+              <a:rPr b="1"/>
+              <a:t>A</a:t>
+            </a:r>
+            <a:r>
+              <a:rPr/>
+              <a:t>mbitious</a:t>
+            </a:r>
+          </a:p>
+          <a:p>
+            <a:pPr lvl="0" indent="0" marL="0">
+              <a:buNone/>
+            </a:pPr>
+            <a:r>
+              <a:rPr/>
+              <a:t>Now it’s time to take another short break!</a:t>
+            </a:r>
+          </a:p>
+        </p:txBody>
+      </p:sp>
+    </p:spTree>
+  </p:cSld>
+</p:sld>
+</file>
+
+<file path=ppt/slides/slide19.xml><?xml version="1.0" encoding="utf-8"?>
+<p:sld xmlns:a="http://schemas.openxmlformats.org/drawingml/2006/main" xmlns:r="http://schemas.openxmlformats.org/officeDocument/2006/relationships" xmlns:p="http://schemas.openxmlformats.org/presentationml/2006/main">
+  <p:cSld>
+    <p:spTree>
+      <p:nvGrpSpPr>
+        <p:cNvPr id="1" name=""/>
+        <p:cNvGrpSpPr/>
+        <p:nvPr/>
+      </p:nvGrpSpPr>
+      <p:grpSpPr>
+        <a:xfrm>
+          <a:off x="0" y="0"/>
+          <a:ext cx="0" cy="0"/>
+          <a:chOff x="0" y="0"/>
+          <a:chExt cx="0" cy="0"/>
+        </a:xfrm>
+      </p:grpSpPr>
+      <p:sp>
+        <p:nvSpPr>
+          <p:cNvPr id="2" name="Title 1"/>
+          <p:cNvSpPr>
+            <a:spLocks noGrp="1"/>
+          </p:cNvSpPr>
+          <p:nvPr>
+            <p:ph type="title"/>
+          </p:nvPr>
+        </p:nvSpPr>
+        <p:spPr/>
+        <p:txBody>
+          <a:bodyPr/>
+          <a:lstStyle/>
+          <a:p>
+            <a:pPr lvl="0" indent="0" marL="0">
+              <a:buNone/>
+            </a:pPr>
+            <a:r>
+              <a:rPr/>
+              <a:t>Route to Value Identification</a:t>
+            </a:r>
+          </a:p>
+        </p:txBody>
+      </p:sp>
+      <p:sp>
+        <p:nvSpPr>
+          <p:cNvPr id="3" name="Content Placeholder 2"/>
+          <p:cNvSpPr>
+            <a:spLocks noGrp="1"/>
+          </p:cNvSpPr>
+          <p:nvPr>
+            <p:ph idx="1"/>
+          </p:nvPr>
+        </p:nvSpPr>
+        <p:spPr/>
+        <p:txBody>
+          <a:bodyPr/>
+          <a:lstStyle/>
+          <a:p>
+            <a:pPr lvl="0" indent="-342900" marL="342900">
+              <a:buAutoNum type="arabicPeriod"/>
+            </a:pPr>
+            <a:r>
+              <a:rPr/>
+              <a:t>Ask the participants to write down about 10 bullet points that describe how success can be delivered</a:t>
+            </a:r>
+          </a:p>
+          <a:p>
+            <a:pPr lvl="1"/>
+            <a:r>
+              <a:rPr/>
+              <a:t>Write the notes individually without discussion and without showing them</a:t>
+            </a:r>
+          </a:p>
+          <a:p>
+            <a:pPr lvl="1"/>
+            <a:r>
+              <a:rPr/>
+              <a:t>If you have any solution options, list them now, we are capturing them to sho wthat there are possible ways forward (we will not discuss them in detail in this workshop)</a:t>
+            </a:r>
+          </a:p>
+          <a:p>
+            <a:pPr lvl="1"/>
+            <a:r>
+              <a:rPr/>
+              <a:t>This should be idealistic, not realistic or pragmatic (we will add that later)</a:t>
+            </a:r>
+          </a:p>
+          <a:p>
+            <a:pPr lvl="0" indent="-342900" marL="342900">
+              <a:buAutoNum type="arabicPeriod"/>
+            </a:pPr>
+            <a:r>
+              <a:rPr/>
+              <a:t>All participants show their notes at the same time</a:t>
+            </a:r>
+          </a:p>
+          <a:p>
+            <a:pPr lvl="0" indent="-342900" marL="342900">
+              <a:buAutoNum type="arabicPeriod"/>
+            </a:pPr>
+            <a:r>
+              <a:rPr/>
+              <a:t>The facilitator talks through each note in turn</a:t>
+            </a:r>
+          </a:p>
+          <a:p>
+            <a:pPr lvl="0" indent="-342900" marL="342900">
+              <a:buAutoNum type="arabicPeriod"/>
+            </a:pPr>
+            <a:r>
+              <a:rPr/>
+              <a:t>The facilitator creates a summary note that captures the agreement and divergence of the team’s contributions</a:t>
+            </a:r>
+          </a:p>
+          <a:p>
+            <a:pPr lvl="0" indent="-342900" marL="342900">
+              <a:buAutoNum type="arabicPeriod"/>
+            </a:pPr>
+            <a:r>
+              <a:rPr/>
+              <a:t>The facilitator asks for any further thoughts from the team and adds to the summary if necessary</a:t>
             </a:r>
           </a:p>
         </p:txBody>
@@ -4619,7 +4684,7 @@
             </a:pPr>
             <a:r>
               <a:rPr/>
-              <a:t>Before we start on any architecture work we need to know what business problem aim to solve​</a:t>
+              <a:t>Before we start on any architecture work we need to know what business problem aim to solve​ and that we can add value</a:t>
             </a:r>
           </a:p>
           <a:p>
@@ -4659,146 +4724,481 @@
               <a:t>Determined if there is potential enterprise architecture to do​</a:t>
             </a:r>
           </a:p>
+        </p:txBody>
+      </p:sp>
+    </p:spTree>
+  </p:cSld>
+</p:sld>
+</file>
+
+<file path=ppt/slides/slide20.xml><?xml version="1.0" encoding="utf-8"?>
+<p:sld xmlns:a="http://schemas.openxmlformats.org/drawingml/2006/main" xmlns:r="http://schemas.openxmlformats.org/officeDocument/2006/relationships" xmlns:p="http://schemas.openxmlformats.org/presentationml/2006/main">
+  <p:cSld>
+    <p:spTree>
+      <p:nvGrpSpPr>
+        <p:cNvPr id="1" name=""/>
+        <p:cNvGrpSpPr/>
+        <p:nvPr/>
+      </p:nvGrpSpPr>
+      <p:grpSpPr>
+        <a:xfrm>
+          <a:off x="0" y="0"/>
+          <a:ext cx="0" cy="0"/>
+          <a:chOff x="0" y="0"/>
+          <a:chExt cx="0" cy="0"/>
+        </a:xfrm>
+      </p:grpSpPr>
+      <p:sp>
+        <p:nvSpPr>
+          <p:cNvPr id="2" name="Title 1"/>
+          <p:cNvSpPr>
+            <a:spLocks noGrp="1"/>
+          </p:cNvSpPr>
+          <p:nvPr>
+            <p:ph type="title"/>
+          </p:nvPr>
+        </p:nvSpPr>
+        <p:spPr/>
+        <p:txBody>
+          <a:bodyPr/>
+          <a:lstStyle/>
           <a:p>
             <a:pPr lvl="0" indent="0" marL="0">
               <a:buNone/>
             </a:pPr>
             <a:r>
               <a:rPr/>
-              <a:t>For enterprise architects (EAs) to add value the problem should be a mess or wicked or both</a:t>
-            </a:r>
-          </a:p>
-          <a:p>
-            <a:pPr lvl="0"/>
-            <a:r>
-              <a:rPr/>
-              <a:t>Messy – has high process, data or technology complexity</a:t>
-            </a:r>
-          </a:p>
-          <a:p>
-            <a:pPr lvl="1"/>
-            <a:r>
-              <a:rPr/>
-              <a:t>problem space is reasonably stable or changes in a predictable way</a:t>
-            </a:r>
-          </a:p>
-          <a:p>
-            <a:pPr lvl="1"/>
-            <a:r>
-              <a:rPr/>
-              <a:t>target state can be defined with a reasonable level of confidence</a:t>
-            </a:r>
-          </a:p>
-          <a:p>
-            <a:pPr lvl="1"/>
-            <a:r>
-              <a:rPr/>
-              <a:t>Enterprise Architects can</a:t>
-            </a:r>
-          </a:p>
-          <a:p>
-            <a:pPr lvl="2"/>
-            <a:r>
-              <a:rPr/>
-              <a:t>make sense of the complexity</a:t>
-            </a:r>
-          </a:p>
-          <a:p>
-            <a:pPr lvl="2"/>
-            <a:r>
-              <a:rPr/>
-              <a:t>help define a target state</a:t>
-            </a:r>
-          </a:p>
-          <a:p>
-            <a:pPr lvl="2"/>
-            <a:r>
-              <a:rPr/>
-              <a:t>help define a roadmap to deliver the target</a:t>
-            </a:r>
-          </a:p>
-          <a:p>
-            <a:pPr lvl="2"/>
-            <a:r>
-              <a:rPr/>
-              <a:t>help define an incremental approach to benefits delivery</a:t>
-            </a:r>
-          </a:p>
-          <a:p>
-            <a:pPr lvl="1"/>
-            <a:r>
-              <a:rPr/>
-              <a:t>EA engagement is likely to be front loaded focused on defining current state, target state and the roadmap followed by a supporting role to help maintain the overall integrity of the approach as the delivery progresses</a:t>
-            </a:r>
-          </a:p>
-          <a:p>
-            <a:pPr lvl="0"/>
-            <a:r>
-              <a:rPr/>
-              <a:t>Wicked – poorly understood</a:t>
-            </a:r>
-          </a:p>
-          <a:p>
-            <a:pPr lvl="1"/>
-            <a:r>
-              <a:rPr/>
-              <a:t>constantly changing problem with complex interdependencies</a:t>
-            </a:r>
-          </a:p>
-          <a:p>
-            <a:pPr lvl="1"/>
-            <a:r>
-              <a:rPr/>
-              <a:t>often has social / people complexity​</a:t>
-            </a:r>
-          </a:p>
-          <a:p>
-            <a:pPr lvl="1"/>
-            <a:r>
-              <a:rPr/>
-              <a:t>significant parts of the target state cannot be defined with confidence</a:t>
-            </a:r>
-          </a:p>
-          <a:p>
-            <a:pPr lvl="1"/>
-            <a:r>
-              <a:rPr/>
-              <a:t>Enterprise Architects can</a:t>
-            </a:r>
-          </a:p>
-          <a:p>
-            <a:pPr lvl="2"/>
-            <a:r>
-              <a:rPr/>
-              <a:t>make sense of the complexity</a:t>
-            </a:r>
-          </a:p>
-          <a:p>
-            <a:pPr lvl="2"/>
-            <a:r>
-              <a:rPr/>
-              <a:t>identify areas of uncertainty</a:t>
-            </a:r>
-          </a:p>
-          <a:p>
-            <a:pPr lvl="2"/>
-            <a:r>
-              <a:rPr/>
-              <a:t>help define incremental and experimental target states</a:t>
-            </a:r>
-          </a:p>
-          <a:p>
-            <a:pPr lvl="2"/>
-            <a:r>
-              <a:rPr/>
-              <a:t>help define an incremental approach to learning and benefits delivery</a:t>
-            </a:r>
-          </a:p>
-          <a:p>
-            <a:pPr lvl="1"/>
-            <a:r>
-              <a:rPr/>
-              <a:t>EA engagement is likely to be continual during the programme</a:t>
+              <a:t>Route to Value Analysis</a:t>
+            </a:r>
+          </a:p>
+        </p:txBody>
+      </p:sp>
+      <p:sp>
+        <p:nvSpPr>
+          <p:cNvPr id="3" name="Content Placeholder 2"/>
+          <p:cNvSpPr>
+            <a:spLocks noGrp="1"/>
+          </p:cNvSpPr>
+          <p:nvPr>
+            <p:ph idx="1"/>
+          </p:nvPr>
+        </p:nvSpPr>
+        <p:spPr/>
+        <p:txBody>
+          <a:bodyPr/>
+          <a:lstStyle/>
+          <a:p>
+            <a:pPr lvl="0" indent="-342900" marL="342900">
+              <a:buAutoNum startAt="5" type="arabicPeriod"/>
+            </a:pPr>
+            <a:r>
+              <a:rPr/>
+              <a:t>The facilitator then leads an analysis of the summary to firm up the route to value and resolve any disagreements.</a:t>
+            </a:r>
+          </a:p>
+          <a:p>
+            <a:pPr lvl="0" indent="-342900" marL="342900">
+              <a:buAutoNum startAt="5" type="arabicPeriod"/>
+            </a:pPr>
+            <a:r>
+              <a:rPr/>
+              <a:t>The next step is to adjust our route to make sure that we being </a:t>
+            </a:r>
+            <a:r>
+              <a:rPr b="1"/>
+              <a:t>realistic</a:t>
+            </a:r>
+            <a:r>
+              <a:rPr/>
+              <a:t>. The following questions can be used as a start point</a:t>
+            </a:r>
+          </a:p>
+          <a:p>
+            <a:pPr lvl="1"/>
+            <a:r>
+              <a:rPr/>
+              <a:t>What is the maximum that should be paid to solve this problem​?</a:t>
+            </a:r>
+          </a:p>
+          <a:p>
+            <a:pPr lvl="1"/>
+            <a:r>
+              <a:rPr/>
+              <a:t>What are the major steps required to deliver the ideal​?</a:t>
+            </a:r>
+          </a:p>
+          <a:p>
+            <a:pPr lvl="1"/>
+            <a:r>
+              <a:rPr/>
+              <a:t>Can these be delivered?</a:t>
+            </a:r>
+          </a:p>
+          <a:p>
+            <a:pPr lvl="1"/>
+            <a:r>
+              <a:rPr/>
+              <a:t>Can the ideal be delivered in phases?</a:t>
+            </a:r>
+          </a:p>
+          <a:p>
+            <a:pPr lvl="1"/>
+            <a:r>
+              <a:rPr/>
+              <a:t>Is there a point before we get to the ideal that is “good enough”?</a:t>
+            </a:r>
+          </a:p>
+          <a:p>
+            <a:pPr lvl="1"/>
+            <a:r>
+              <a:rPr/>
+              <a:t>What are the big risks, issues, blockers, concerns, constraints​ that may stop us achieving the ideal?</a:t>
+            </a:r>
+          </a:p>
+          <a:p>
+            <a:pPr lvl="1"/>
+            <a:r>
+              <a:rPr/>
+              <a:t>Are any critical details that could derail us​?</a:t>
+            </a:r>
+          </a:p>
+          <a:p>
+            <a:pPr lvl="1"/>
+            <a:r>
+              <a:rPr/>
+              <a:t>How does this change our definition of success?</a:t>
+            </a:r>
+          </a:p>
+          <a:p>
+            <a:pPr lvl="1"/>
+            <a:r>
+              <a:rPr/>
+              <a:t>Is it still </a:t>
+            </a:r>
+            <a:r>
+              <a:rPr b="1"/>
+              <a:t>significant</a:t>
+            </a:r>
+            <a:r>
+              <a:rPr/>
+              <a:t>, </a:t>
+            </a:r>
+            <a:r>
+              <a:rPr b="1"/>
+              <a:t>measureable</a:t>
+            </a:r>
+            <a:r>
+              <a:rPr/>
+              <a:t> and </a:t>
+            </a:r>
+            <a:r>
+              <a:rPr b="1"/>
+              <a:t>ambitious</a:t>
+            </a:r>
+            <a:r>
+              <a:rPr/>
+              <a:t>?​</a:t>
+            </a:r>
+          </a:p>
+          <a:p>
+            <a:pPr lvl="0" indent="-342900" marL="342900">
+              <a:buAutoNum startAt="5" type="arabicPeriod"/>
+            </a:pPr>
+            <a:r>
+              <a:rPr/>
+              <a:t>We now have a view of success, a target state that is</a:t>
+            </a:r>
+          </a:p>
+          <a:p>
+            <a:pPr lvl="1" indent="0" marL="342900">
+              <a:buNone/>
+            </a:pPr>
+            <a:r>
+              <a:rPr b="1"/>
+              <a:t>S</a:t>
+            </a:r>
+            <a:r>
+              <a:rPr/>
+              <a:t>ignificant </a:t>
+            </a:r>
+            <a:r>
+              <a:rPr b="1"/>
+              <a:t>M</a:t>
+            </a:r>
+            <a:r>
+              <a:rPr/>
+              <a:t>easureable </a:t>
+            </a:r>
+            <a:r>
+              <a:rPr b="1"/>
+              <a:t>A</a:t>
+            </a:r>
+            <a:r>
+              <a:rPr/>
+              <a:t>mbitious </a:t>
+            </a:r>
+            <a:r>
+              <a:rPr b="1"/>
+              <a:t>R</a:t>
+            </a:r>
+            <a:r>
+              <a:rPr/>
+              <a:t>ealistic </a:t>
+            </a:r>
+            <a:r>
+              <a:rPr b="1"/>
+              <a:t>T</a:t>
+            </a:r>
+            <a:r>
+              <a:rPr/>
+              <a:t>imebound</a:t>
+            </a:r>
+          </a:p>
+          <a:p>
+            <a:pPr lvl="0" indent="0" marL="0">
+              <a:buNone/>
+            </a:pPr>
+            <a:r>
+              <a:rPr/>
+              <a:t>Now we should have another short break!</a:t>
+            </a:r>
+          </a:p>
+        </p:txBody>
+      </p:sp>
+    </p:spTree>
+  </p:cSld>
+</p:sld>
+</file>
+
+<file path=ppt/slides/slide21.xml><?xml version="1.0" encoding="utf-8"?>
+<p:sld xmlns:a="http://schemas.openxmlformats.org/drawingml/2006/main" xmlns:r="http://schemas.openxmlformats.org/officeDocument/2006/relationships" xmlns:p="http://schemas.openxmlformats.org/presentationml/2006/main">
+  <p:cSld>
+    <p:spTree>
+      <p:nvGrpSpPr>
+        <p:cNvPr id="1" name=""/>
+        <p:cNvGrpSpPr/>
+        <p:nvPr/>
+      </p:nvGrpSpPr>
+      <p:grpSpPr>
+        <a:xfrm>
+          <a:off x="0" y="0"/>
+          <a:ext cx="0" cy="0"/>
+          <a:chOff x="0" y="0"/>
+          <a:chExt cx="0" cy="0"/>
+        </a:xfrm>
+      </p:grpSpPr>
+      <p:sp>
+        <p:nvSpPr>
+          <p:cNvPr id="2" name="Title 1"/>
+          <p:cNvSpPr>
+            <a:spLocks noGrp="1"/>
+          </p:cNvSpPr>
+          <p:nvPr>
+            <p:ph type="title"/>
+          </p:nvPr>
+        </p:nvSpPr>
+        <p:spPr/>
+        <p:txBody>
+          <a:bodyPr/>
+          <a:lstStyle/>
+          <a:p>
+            <a:pPr lvl="0" indent="0" marL="0">
+              <a:buNone/>
+            </a:pPr>
+            <a:r>
+              <a:rPr/>
+              <a:t>Stakeholders</a:t>
+            </a:r>
+          </a:p>
+        </p:txBody>
+      </p:sp>
+      <p:sp>
+        <p:nvSpPr>
+          <p:cNvPr id="3" name="Content Placeholder 2"/>
+          <p:cNvSpPr>
+            <a:spLocks noGrp="1"/>
+          </p:cNvSpPr>
+          <p:nvPr>
+            <p:ph idx="1"/>
+          </p:nvPr>
+        </p:nvSpPr>
+        <p:spPr/>
+        <p:txBody>
+          <a:bodyPr/>
+          <a:lstStyle/>
+          <a:p>
+            <a:pPr lvl="0" indent="0" marL="0">
+              <a:buNone/>
+            </a:pPr>
+            <a:r>
+              <a:rPr/>
+              <a:t>who pays​ who cares​ who can cause problems​ who needs to support​ who do we need to persuade to back us​</a:t>
+            </a:r>
+          </a:p>
+        </p:txBody>
+      </p:sp>
+    </p:spTree>
+  </p:cSld>
+</p:sld>
+</file>
+
+<file path=ppt/slides/slide22.xml><?xml version="1.0" encoding="utf-8"?>
+<p:sld xmlns:a="http://schemas.openxmlformats.org/drawingml/2006/main" xmlns:r="http://schemas.openxmlformats.org/officeDocument/2006/relationships" xmlns:p="http://schemas.openxmlformats.org/presentationml/2006/main">
+  <p:cSld>
+    <p:spTree>
+      <p:nvGrpSpPr>
+        <p:cNvPr id="1" name=""/>
+        <p:cNvGrpSpPr/>
+        <p:nvPr/>
+      </p:nvGrpSpPr>
+      <p:grpSpPr>
+        <a:xfrm>
+          <a:off x="0" y="0"/>
+          <a:ext cx="0" cy="0"/>
+          <a:chOff x="0" y="0"/>
+          <a:chExt cx="0" cy="0"/>
+        </a:xfrm>
+      </p:grpSpPr>
+      <p:sp>
+        <p:nvSpPr>
+          <p:cNvPr id="2" name="Title 1"/>
+          <p:cNvSpPr>
+            <a:spLocks noGrp="1"/>
+          </p:cNvSpPr>
+          <p:nvPr>
+            <p:ph type="title"/>
+          </p:nvPr>
+        </p:nvSpPr>
+        <p:spPr/>
+        <p:txBody>
+          <a:bodyPr/>
+          <a:lstStyle/>
+          <a:p>
+            <a:pPr lvl="0" indent="0" marL="0">
+              <a:buNone/>
+            </a:pPr>
+            <a:r>
+              <a:rPr/>
+              <a:t>Decisions</a:t>
+            </a:r>
+          </a:p>
+        </p:txBody>
+      </p:sp>
+      <p:sp>
+        <p:nvSpPr>
+          <p:cNvPr id="3" name="Content Placeholder 2"/>
+          <p:cNvSpPr>
+            <a:spLocks noGrp="1"/>
+          </p:cNvSpPr>
+          <p:nvPr>
+            <p:ph idx="1"/>
+          </p:nvPr>
+        </p:nvSpPr>
+        <p:spPr/>
+        <p:txBody>
+          <a:bodyPr/>
+          <a:lstStyle/>
+          <a:p>
+            <a:pPr lvl="0" indent="0" marL="0">
+              <a:buNone/>
+            </a:pPr>
+            <a:r>
+              <a:rPr/>
+              <a:t>go / no go - should we look for solutions?​ who will plan next steps and when​ is there a role for enterprise architects</a:t>
+            </a:r>
+          </a:p>
+        </p:txBody>
+      </p:sp>
+    </p:spTree>
+  </p:cSld>
+</p:sld>
+</file>
+
+<file path=ppt/slides/slide23.xml><?xml version="1.0" encoding="utf-8"?>
+<p:sld xmlns:a="http://schemas.openxmlformats.org/drawingml/2006/main" xmlns:r="http://schemas.openxmlformats.org/officeDocument/2006/relationships" xmlns:p="http://schemas.openxmlformats.org/presentationml/2006/main">
+  <p:cSld>
+    <p:spTree>
+      <p:nvGrpSpPr>
+        <p:cNvPr id="1" name=""/>
+        <p:cNvGrpSpPr/>
+        <p:nvPr/>
+      </p:nvGrpSpPr>
+      <p:grpSpPr>
+        <a:xfrm>
+          <a:off x="0" y="0"/>
+          <a:ext cx="0" cy="0"/>
+          <a:chOff x="0" y="0"/>
+          <a:chExt cx="0" cy="0"/>
+        </a:xfrm>
+      </p:grpSpPr>
+      <p:sp>
+        <p:nvSpPr>
+          <p:cNvPr id="2" name="Title 1"/>
+          <p:cNvSpPr>
+            <a:spLocks noGrp="1"/>
+          </p:cNvSpPr>
+          <p:nvPr>
+            <p:ph type="title"/>
+          </p:nvPr>
+        </p:nvSpPr>
+        <p:spPr/>
+        <p:txBody>
+          <a:bodyPr/>
+          <a:lstStyle/>
+          <a:p>
+            <a:pPr lvl="0" indent="0" marL="0">
+              <a:buNone/>
+            </a:pPr>
+            <a:r>
+              <a:rPr/>
+              <a:t>Architecture Challenge Canvas</a:t>
+            </a:r>
+          </a:p>
+        </p:txBody>
+      </p:sp>
+    </p:spTree>
+  </p:cSld>
+</p:sld>
+</file>
+
+<file path=ppt/slides/slide24.xml><?xml version="1.0" encoding="utf-8"?>
+<p:sld xmlns:a="http://schemas.openxmlformats.org/drawingml/2006/main" xmlns:r="http://schemas.openxmlformats.org/officeDocument/2006/relationships" xmlns:p="http://schemas.openxmlformats.org/presentationml/2006/main">
+  <p:cSld>
+    <p:spTree>
+      <p:nvGrpSpPr>
+        <p:cNvPr id="1" name=""/>
+        <p:cNvGrpSpPr/>
+        <p:nvPr/>
+      </p:nvGrpSpPr>
+      <p:grpSpPr>
+        <a:xfrm>
+          <a:off x="0" y="0"/>
+          <a:ext cx="0" cy="0"/>
+          <a:chOff x="0" y="0"/>
+          <a:chExt cx="0" cy="0"/>
+        </a:xfrm>
+      </p:grpSpPr>
+      <p:sp>
+        <p:nvSpPr>
+          <p:cNvPr id="2" name="Title 1"/>
+          <p:cNvSpPr>
+            <a:spLocks noGrp="1"/>
+          </p:cNvSpPr>
+          <p:nvPr>
+            <p:ph type="title"/>
+          </p:nvPr>
+        </p:nvSpPr>
+        <p:spPr/>
+        <p:txBody>
+          <a:bodyPr/>
+          <a:lstStyle/>
+          <a:p>
+            <a:pPr lvl="0" indent="0" marL="0">
+              <a:buNone/>
+            </a:pPr>
+            <a:r>
+              <a:rPr/>
+              <a:t>Example</a:t>
             </a:r>
           </a:p>
         </p:txBody>
@@ -4845,7 +5245,7 @@
             </a:pPr>
             <a:r>
               <a:rPr/>
-              <a:t>Contents</a:t>
+              <a:t>When do Enterprise Architects add value?</a:t>
             </a:r>
           </a:p>
         </p:txBody>
@@ -4866,164 +5266,32 @@
           <a:lstStyle/>
           <a:p>
             <a:pPr lvl="0" indent="0" marL="0">
-              <a:spcBef>
-                <a:spcPts val="3000"/>
-              </a:spcBef>
-              <a:buNone/>
-            </a:pPr>
-            <a:r>
-              <a:rPr b="1"/>
-              <a:t>Workshop Set Up</a:t>
-            </a:r>
-          </a:p>
-          <a:p>
-            <a:pPr lvl="0" indent="-342900" marL="342900">
-              <a:buAutoNum type="arabicPeriod"/>
-            </a:pPr>
-            <a:r>
-              <a:rPr/>
-              <a:t>Pre-condition</a:t>
-            </a:r>
-          </a:p>
-          <a:p>
-            <a:pPr lvl="0" indent="-342900" marL="342900">
-              <a:buAutoNum type="arabicPeriod"/>
-            </a:pPr>
-            <a:r>
-              <a:rPr/>
-              <a:t>Attendees</a:t>
-            </a:r>
-          </a:p>
-          <a:p>
-            <a:pPr lvl="0" indent="-342900" marL="342900">
-              <a:buAutoNum type="arabicPeriod"/>
-            </a:pPr>
-            <a:r>
-              <a:rPr/>
-              <a:t>Invitation</a:t>
-            </a:r>
-          </a:p>
-          <a:p>
-            <a:pPr lvl="0" indent="-342900" marL="342900">
-              <a:buAutoNum type="arabicPeriod"/>
-            </a:pPr>
-            <a:r>
-              <a:rPr/>
-              <a:t>Workshop roles</a:t>
-            </a:r>
-          </a:p>
-          <a:p>
-            <a:pPr lvl="0" indent="-342900" marL="342900">
-              <a:buAutoNum type="arabicPeriod"/>
-            </a:pPr>
-            <a:r>
-              <a:rPr/>
-              <a:t>Ground rules</a:t>
-            </a:r>
-          </a:p>
-          <a:p>
-            <a:pPr lvl="0" indent="0" marL="0">
-              <a:spcBef>
-                <a:spcPts val="3000"/>
-              </a:spcBef>
-              <a:buNone/>
-            </a:pPr>
-            <a:r>
-              <a:rPr b="1"/>
-              <a:t>Workshop Agenda</a:t>
-            </a:r>
-          </a:p>
-          <a:p>
-            <a:pPr lvl="0" indent="-342900" marL="342900">
-              <a:buAutoNum type="arabicPeriod"/>
-            </a:pPr>
-            <a:r>
-              <a:rPr/>
-              <a:t>The challenge</a:t>
-            </a:r>
-          </a:p>
-          <a:p>
-            <a:pPr lvl="0" indent="-342900" marL="342900">
-              <a:buAutoNum type="arabicPeriod"/>
-            </a:pPr>
-            <a:r>
-              <a:rPr/>
-              <a:t>Problem identification</a:t>
-            </a:r>
-          </a:p>
-          <a:p>
-            <a:pPr lvl="0" indent="-342900" marL="342900">
-              <a:buAutoNum type="arabicPeriod"/>
-            </a:pPr>
-            <a:r>
-              <a:rPr/>
-              <a:t>Break​</a:t>
-            </a:r>
-          </a:p>
-          <a:p>
-            <a:pPr lvl="0" indent="-342900" marL="342900">
-              <a:buAutoNum type="arabicPeriod"/>
-            </a:pPr>
-            <a:r>
-              <a:rPr/>
-              <a:t>Defining success</a:t>
-            </a:r>
-          </a:p>
-          <a:p>
-            <a:pPr lvl="0" indent="-342900" marL="342900">
-              <a:buAutoNum type="arabicPeriod"/>
-            </a:pPr>
-            <a:r>
-              <a:rPr/>
-              <a:t>Break​</a:t>
-            </a:r>
-          </a:p>
-          <a:p>
-            <a:pPr lvl="0" indent="-342900" marL="342900">
-              <a:buAutoNum type="arabicPeriod"/>
-            </a:pPr>
-            <a:r>
-              <a:rPr/>
-              <a:t>Route to value</a:t>
-            </a:r>
-          </a:p>
-          <a:p>
-            <a:pPr lvl="0" indent="-342900" marL="342900">
-              <a:buAutoNum type="arabicPeriod"/>
-            </a:pPr>
-            <a:r>
-              <a:rPr/>
-              <a:t>Break​</a:t>
-            </a:r>
-          </a:p>
-          <a:p>
-            <a:pPr lvl="0" indent="-342900" marL="342900">
-              <a:buAutoNum type="arabicPeriod"/>
-            </a:pPr>
-            <a:r>
-              <a:rPr/>
-              <a:t>Key stakeholders</a:t>
-            </a:r>
-          </a:p>
-          <a:p>
-            <a:pPr lvl="0" indent="-342900" marL="342900">
-              <a:buAutoNum type="arabicPeriod"/>
-            </a:pPr>
-            <a:r>
-              <a:rPr/>
-              <a:t>Decisions</a:t>
-            </a:r>
-          </a:p>
-          <a:p>
-            <a:pPr lvl="0" indent="0" marL="0">
-              <a:spcBef>
-                <a:spcPts val="3000"/>
-              </a:spcBef>
-              <a:buNone/>
-            </a:pPr>
-            <a:r>
-              <a:rPr b="1"/>
-              <a:t>Total duration - 4 to 6 hours</a:t>
+              <a:buNone/>
+            </a:pPr>
+            <a:r>
+              <a:rPr/>
+              <a:t>Enterprise architects (EAs) add value by</a:t>
+            </a:r>
+          </a:p>
+          <a:p>
+            <a:pPr lvl="0"/>
+            <a:r>
+              <a:rPr/>
+              <a:t>making sense of complexity</a:t>
+            </a:r>
+          </a:p>
+          <a:p>
+            <a:pPr lvl="0"/>
+            <a:r>
+              <a:rPr/>
+              <a:t>navigating through complexity</a:t>
+            </a:r>
+          </a:p>
+          <a:p>
+            <a:pPr lvl="0"/>
+            <a:r>
+              <a:rPr/>
+              <a:t>helping to manage uncertainty</a:t>
             </a:r>
           </a:p>
         </p:txBody>
@@ -5070,7 +5338,7 @@
             </a:pPr>
             <a:r>
               <a:rPr/>
-              <a:t>Precondition</a:t>
+              <a:t>Messy Problems</a:t>
             </a:r>
           </a:p>
         </p:txBody>
@@ -5090,77 +5358,68 @@
           <a:bodyPr/>
           <a:lstStyle/>
           <a:p>
+            <a:pPr lvl="0"/>
+            <a:r>
+              <a:rPr/>
+              <a:t>have high process, data or technology complexity</a:t>
+            </a:r>
+          </a:p>
+          <a:p>
+            <a:pPr lvl="0"/>
+            <a:r>
+              <a:rPr/>
+              <a:t>problem space is reasonably stable or changes in a predictable way</a:t>
+            </a:r>
+          </a:p>
+          <a:p>
+            <a:pPr lvl="0"/>
+            <a:r>
+              <a:rPr/>
+              <a:t>target state can be defined with a reasonable level of confidence</a:t>
+            </a:r>
+          </a:p>
+          <a:p>
+            <a:pPr lvl="0"/>
+            <a:r>
+              <a:rPr/>
+              <a:t>Enterprise Architects can help</a:t>
+            </a:r>
+          </a:p>
+          <a:p>
+            <a:pPr lvl="1"/>
+            <a:r>
+              <a:rPr/>
+              <a:t>make sense of the complexity</a:t>
+            </a:r>
+          </a:p>
+          <a:p>
+            <a:pPr lvl="1"/>
+            <a:r>
+              <a:rPr/>
+              <a:t>define a target state</a:t>
+            </a:r>
+          </a:p>
+          <a:p>
+            <a:pPr lvl="1"/>
+            <a:r>
+              <a:rPr/>
+              <a:t>define a roadmap to deliver the target</a:t>
+            </a:r>
+          </a:p>
+          <a:p>
+            <a:pPr lvl="1"/>
+            <a:r>
+              <a:rPr/>
+              <a:t>define an incremental approach to benefits delivery</a:t>
+            </a:r>
+          </a:p>
+          <a:p>
             <a:pPr lvl="0" indent="0" marL="0">
               <a:buNone/>
             </a:pPr>
             <a:r>
               <a:rPr/>
-              <a:t>A concern of potentially enterprise wide significance has been identified by an EA​</a:t>
-            </a:r>
-          </a:p>
-          <a:p>
-            <a:pPr lvl="0" indent="0" marL="0">
-              <a:buNone/>
-            </a:pPr>
-            <a:r>
-              <a:rPr/>
-              <a:t>e.g.​</a:t>
-            </a:r>
-          </a:p>
-          <a:p>
-            <a:pPr lvl="0"/>
-            <a:r>
-              <a:rPr/>
-              <a:t>A senior stakeholder says “take a look at this…”​</a:t>
-            </a:r>
-          </a:p>
-          <a:p>
-            <a:pPr lvl="0"/>
-            <a:r>
-              <a:rPr/>
-              <a:t>An EA gets an idea at a conference​</a:t>
-            </a:r>
-          </a:p>
-          <a:p>
-            <a:pPr lvl="0"/>
-            <a:r>
-              <a:rPr/>
-              <a:t>An EA hears a worrying statement in a meeting about…​</a:t>
-            </a:r>
-          </a:p>
-          <a:p>
-            <a:pPr lvl="1"/>
-            <a:r>
-              <a:rPr/>
-              <a:t>Project​</a:t>
-            </a:r>
-          </a:p>
-          <a:p>
-            <a:pPr lvl="1"/>
-            <a:r>
-              <a:rPr/>
-              <a:t>Technical debt​</a:t>
-            </a:r>
-          </a:p>
-          <a:p>
-            <a:pPr lvl="1"/>
-            <a:r>
-              <a:rPr/>
-              <a:t>Lack of collaboration​</a:t>
-            </a:r>
-          </a:p>
-          <a:p>
-            <a:pPr lvl="1"/>
-            <a:r>
-              <a:rPr/>
-              <a:t>Siloes​</a:t>
-            </a:r>
-          </a:p>
-          <a:p>
-            <a:pPr lvl="0"/>
-            <a:r>
-              <a:rPr/>
-              <a:t>An experienced EA just gets a sense that something is wrong!​</a:t>
+              <a:t>EA engagement is likely to be front loaded focused on defining current state, target state and the roadmap followed by a supporting role to help maintain the overall integrity of the approach in the delivery progresses</a:t>
             </a:r>
           </a:p>
         </p:txBody>
@@ -5207,7 +5466,7 @@
             </a:pPr>
             <a:r>
               <a:rPr/>
-              <a:t>Attendees</a:t>
+              <a:t>Wicked Problems</a:t>
             </a:r>
           </a:p>
         </p:txBody>
@@ -5227,48 +5486,75 @@
           <a:bodyPr/>
           <a:lstStyle/>
           <a:p>
+            <a:pPr lvl="0"/>
+            <a:r>
+              <a:rPr/>
+              <a:t>poorly understood</a:t>
+            </a:r>
+          </a:p>
+          <a:p>
+            <a:pPr lvl="0"/>
+            <a:r>
+              <a:rPr/>
+              <a:t>constantly changing problem with complex interdependencies</a:t>
+            </a:r>
+          </a:p>
+          <a:p>
+            <a:pPr lvl="0"/>
+            <a:r>
+              <a:rPr/>
+              <a:t>often have significant social / people complexity​</a:t>
+            </a:r>
+          </a:p>
+          <a:p>
+            <a:pPr lvl="0"/>
+            <a:r>
+              <a:rPr/>
+              <a:t>large parts of the currrent and / or target state cannot be defined with confidence</a:t>
+            </a:r>
+          </a:p>
+          <a:p>
+            <a:pPr lvl="0"/>
+            <a:r>
+              <a:rPr/>
+              <a:t>Enterprise Architects can help</a:t>
+            </a:r>
+          </a:p>
+          <a:p>
+            <a:pPr lvl="1"/>
+            <a:r>
+              <a:rPr/>
+              <a:t>make sense of the complexity</a:t>
+            </a:r>
+          </a:p>
+          <a:p>
+            <a:pPr lvl="1"/>
+            <a:r>
+              <a:rPr/>
+              <a:t>identify areas of uncertainty</a:t>
+            </a:r>
+          </a:p>
+          <a:p>
+            <a:pPr lvl="1"/>
+            <a:r>
+              <a:rPr/>
+              <a:t>define experiments and nudges to enable learning</a:t>
+            </a:r>
+          </a:p>
+          <a:p>
+            <a:pPr lvl="1"/>
+            <a:r>
+              <a:rPr/>
+              <a:t>define an incremental approach to benefits delivery</a:t>
+            </a:r>
+          </a:p>
+          <a:p>
             <a:pPr lvl="0" indent="0" marL="0">
               <a:buNone/>
             </a:pPr>
             <a:r>
               <a:rPr/>
-              <a:t>There are three formats for this - - Informal with EAs only​ - More formal with key stakeholders and EAs​ - Multiple stakeholder meetings followed by a joint playback​</a:t>
-            </a:r>
-          </a:p>
-          <a:p>
-            <a:pPr lvl="0" indent="0" marL="0">
-              <a:buNone/>
-            </a:pPr>
-            <a:r>
-              <a:rPr/>
-              <a:t>You can combine formats if it helps​ - You want a rehearsal with EAs only​ - You want to make sense of what the stakeholders said (e.g. create the stakeholder playback)​</a:t>
-            </a:r>
-          </a:p>
-          <a:p>
-            <a:pPr lvl="0" indent="0" marL="0">
-              <a:buNone/>
-            </a:pPr>
-            <a:r>
-              <a:rPr/>
-              <a:t>5 to 8 people is an ideal size for the meeting​</a:t>
-            </a:r>
-          </a:p>
-          <a:p>
-            <a:pPr lvl="0" indent="0" marL="0">
-              <a:buNone/>
-            </a:pPr>
-            <a:r>
-              <a:rPr/>
-              <a:t>Give attendees plenty of notice of the meeting</a:t>
-            </a:r>
-          </a:p>
-          <a:p>
-            <a:pPr lvl="0" indent="0" marL="0">
-              <a:buNone/>
-            </a:pPr>
-            <a:r>
-              <a:rPr/>
-              <a:t>Meetings can be fully remote​</a:t>
+              <a:t>EA engagement is likely to be continual during the programme</a:t>
             </a:r>
           </a:p>
         </p:txBody>
@@ -5315,7 +5601,7 @@
             </a:pPr>
             <a:r>
               <a:rPr/>
-              <a:t>The Invitation</a:t>
+              <a:t>Workshop Set Up</a:t>
             </a:r>
           </a:p>
         </p:txBody>
@@ -5335,65 +5621,48 @@
           <a:bodyPr/>
           <a:lstStyle/>
           <a:p>
-            <a:pPr lvl="0" indent="0" marL="1270000">
-              <a:buNone/>
-            </a:pPr>
-            <a:r>
-              <a:rPr sz="2000" i="1"/>
-              <a:t>Hi AP</a:t>
-            </a:r>
-          </a:p>
-          <a:p>
-            <a:pPr lvl="0" indent="0" marL="1270000">
-              <a:buNone/>
-            </a:pPr>
-            <a:r>
-              <a:rPr sz="2000" i="1"/>
-              <a:t>As I am sure you are aware we have major challenges with providing insights to leaders within the business.</a:t>
-            </a:r>
-          </a:p>
-          <a:p>
-            <a:pPr lvl="0" indent="0" marL="1270000">
-              <a:buNone/>
-            </a:pPr>
-            <a:r>
-              <a:rPr sz="2000" i="1"/>
-              <a:t>We are running a workshop to develop a strong problem statement and work out how to kick off an initiative to improve the situation.</a:t>
-            </a:r>
-            <a:r>
-              <a:rPr sz="2000"/>
-              <a:t> </a:t>
-            </a:r>
-            <a:r>
-              <a:rPr sz="2000" i="1"/>
-              <a:t>You will see an invitation to a video call in your inbox soon.</a:t>
-            </a:r>
-          </a:p>
-          <a:p>
-            <a:pPr lvl="0" indent="0" marL="1270000">
-              <a:buNone/>
-            </a:pPr>
-            <a:r>
-              <a:rPr sz="2000" i="1"/>
-              <a:t>I am looking forward to your valuable contribution.</a:t>
-            </a:r>
-          </a:p>
-          <a:p>
-            <a:pPr lvl="0" indent="0" marL="1270000">
-              <a:buNone/>
-            </a:pPr>
-            <a:r>
-              <a:rPr sz="2000" i="1"/>
-              <a:t>Best wishes</a:t>
-            </a:r>
-          </a:p>
-          <a:p>
-            <a:pPr lvl="0" indent="0" marL="1270000">
-              <a:buNone/>
-            </a:pPr>
-            <a:r>
-              <a:rPr sz="2000" i="1"/>
-              <a:t>JJ - Head of Enterprise Architecture</a:t>
+            <a:pPr lvl="0" indent="-342900" marL="342900">
+              <a:buAutoNum type="arabicPeriod"/>
+            </a:pPr>
+            <a:r>
+              <a:rPr/>
+              <a:t>Pre-condition</a:t>
+            </a:r>
+          </a:p>
+          <a:p>
+            <a:pPr lvl="0" indent="-342900" marL="342900">
+              <a:buAutoNum type="arabicPeriod"/>
+            </a:pPr>
+            <a:r>
+              <a:rPr/>
+              <a:t>Attendees</a:t>
+            </a:r>
+          </a:p>
+          <a:p>
+            <a:pPr lvl="0" indent="-342900" marL="342900">
+              <a:buAutoNum type="arabicPeriod"/>
+            </a:pPr>
+            <a:r>
+              <a:rPr/>
+              <a:t>Invitation</a:t>
+            </a:r>
+          </a:p>
+          <a:p>
+            <a:pPr lvl="0" indent="-342900" marL="342900">
+              <a:buAutoNum type="arabicPeriod"/>
+            </a:pPr>
+            <a:r>
+              <a:rPr/>
+              <a:t>Workshop roles</a:t>
+            </a:r>
+          </a:p>
+          <a:p>
+            <a:pPr lvl="0" indent="-342900" marL="342900">
+              <a:buAutoNum type="arabicPeriod"/>
+            </a:pPr>
+            <a:r>
+              <a:rPr/>
+              <a:t>Ground rules</a:t>
             </a:r>
           </a:p>
         </p:txBody>
@@ -5440,7 +5709,7 @@
             </a:pPr>
             <a:r>
               <a:rPr/>
-              <a:t>Roles</a:t>
+              <a:t>Precondition</a:t>
             </a:r>
           </a:p>
         </p:txBody>
@@ -5465,35 +5734,72 @@
             </a:pPr>
             <a:r>
               <a:rPr/>
-              <a:t>The workshop will require these roles to be successful -</a:t>
+              <a:t>A concern of potentially enterprise wide significance has been identified by an EA​</a:t>
+            </a:r>
+          </a:p>
+          <a:p>
+            <a:pPr lvl="0" indent="0" marL="0">
+              <a:buNone/>
+            </a:pPr>
+            <a:r>
+              <a:rPr/>
+              <a:t>e.g.​</a:t>
             </a:r>
           </a:p>
           <a:p>
             <a:pPr lvl="0"/>
             <a:r>
               <a:rPr/>
-              <a:t>Facilitator - takes the attendees through the workshop structure, adapting it as necessary, owns the schedule</a:t>
+              <a:t>A senior stakeholder says “take a look at this…”​</a:t>
             </a:r>
           </a:p>
           <a:p>
             <a:pPr lvl="0"/>
             <a:r>
               <a:rPr/>
-              <a:t>Challenge owner - presents the challenge, makes decisions when asked to do so by the Facilitator, maybe a proxy for a key stakeholder</a:t>
+              <a:t>An EA gets an idea at a conference​</a:t>
             </a:r>
           </a:p>
           <a:p>
             <a:pPr lvl="0"/>
             <a:r>
               <a:rPr/>
-              <a:t>Scribe - makes notes when asked to do so by the facilitator</a:t>
+              <a:t>An EA hears a worrying statement in a meeting about…​</a:t>
+            </a:r>
+          </a:p>
+          <a:p>
+            <a:pPr lvl="1"/>
+            <a:r>
+              <a:rPr/>
+              <a:t>Project​</a:t>
+            </a:r>
+          </a:p>
+          <a:p>
+            <a:pPr lvl="1"/>
+            <a:r>
+              <a:rPr/>
+              <a:t>Technical debt​</a:t>
+            </a:r>
+          </a:p>
+          <a:p>
+            <a:pPr lvl="1"/>
+            <a:r>
+              <a:rPr/>
+              <a:t>Lack of collaboration​</a:t>
+            </a:r>
+          </a:p>
+          <a:p>
+            <a:pPr lvl="1"/>
+            <a:r>
+              <a:rPr/>
+              <a:t>Siloes​</a:t>
             </a:r>
           </a:p>
           <a:p>
             <a:pPr lvl="0"/>
             <a:r>
               <a:rPr/>
-              <a:t>Timekeeper - keeps time when asked to do so by the facilitator</a:t>
+              <a:t>An experienced EA just gets a sense that something is wrong!​</a:t>
             </a:r>
           </a:p>
         </p:txBody>
@@ -5540,7 +5846,7 @@
             </a:pPr>
             <a:r>
               <a:rPr/>
-              <a:t>Ground rules</a:t>
+              <a:t>Workshop formats</a:t>
             </a:r>
           </a:p>
         </p:txBody>
@@ -5560,74 +5866,33 @@
           <a:bodyPr/>
           <a:lstStyle/>
           <a:p>
-            <a:pPr lvl="0" indent="-342900" marL="342900">
-              <a:buAutoNum type="arabicPeriod"/>
-            </a:pPr>
-            <a:r>
-              <a:rPr/>
-              <a:t>The Facilitator is in charge</a:t>
-            </a:r>
-          </a:p>
-          <a:p>
-            <a:pPr lvl="0" indent="-342900" marL="342900">
-              <a:buAutoNum type="arabicPeriod"/>
-            </a:pPr>
-            <a:r>
-              <a:rPr/>
-              <a:t>Challenge owner makes decisions</a:t>
-            </a:r>
-          </a:p>
-          <a:p>
-            <a:pPr lvl="0" indent="-342900" marL="342900">
-              <a:buAutoNum type="arabicPeriod"/>
-            </a:pPr>
-            <a:r>
-              <a:rPr/>
-              <a:t>No distractions from phones or emails or chat</a:t>
-            </a:r>
-          </a:p>
-          <a:p>
-            <a:pPr lvl="1"/>
-            <a:r>
-              <a:rPr/>
-              <a:t>switch off notifications</a:t>
-            </a:r>
-          </a:p>
-          <a:p>
-            <a:pPr lvl="1"/>
-            <a:r>
-              <a:rPr/>
-              <a:t>we will have breaks</a:t>
-            </a:r>
-          </a:p>
-          <a:p>
-            <a:pPr lvl="0" indent="-342900" marL="342900">
-              <a:buAutoNum type="arabicPeriod"/>
-            </a:pPr>
-            <a:r>
-              <a:rPr/>
-              <a:t>Don’t worry about children, pets, partners, deliveries, builders, etc</a:t>
-            </a:r>
-          </a:p>
-          <a:p>
-            <a:pPr lvl="1"/>
-            <a:r>
-              <a:rPr/>
-              <a:t>they will interrupt and distract, it is OK!</a:t>
-            </a:r>
-          </a:p>
-          <a:p>
-            <a:pPr lvl="1"/>
-            <a:r>
-              <a:rPr/>
-              <a:t>this is normal!</a:t>
-            </a:r>
-          </a:p>
-          <a:p>
-            <a:pPr lvl="1"/>
-            <a:r>
-              <a:rPr/>
-              <a:t>sometimes they help with the creativity…</a:t>
+            <a:pPr lvl="0" indent="0" marL="0">
+              <a:buNone/>
+            </a:pPr>
+            <a:r>
+              <a:rPr/>
+              <a:t>There are three formats that we use</a:t>
+            </a:r>
+          </a:p>
+          <a:p>
+            <a:pPr lvl="0"/>
+            <a:r>
+              <a:rPr/>
+              <a:t>Informal with EAs only​</a:t>
+            </a:r>
+          </a:p>
+          <a:p>
+            <a:pPr lvl="0"/>
+            <a:r>
+              <a:rPr/>
+              <a:t>More formal with key stakeholders and EAs​</a:t>
+            </a:r>
+          </a:p>
+          <a:p>
+            <a:pPr lvl="0"/>
+            <a:r>
+              <a:rPr/>
+              <a:t>Multiple stakeholder meetings followed by a joint playback​</a:t>
             </a:r>
           </a:p>
         </p:txBody>
@@ -5674,7 +5939,73 @@
             </a:pPr>
             <a:r>
               <a:rPr/>
-              <a:t>The Workshop</a:t>
+              <a:t>Attendees</a:t>
+            </a:r>
+          </a:p>
+        </p:txBody>
+      </p:sp>
+      <p:sp>
+        <p:nvSpPr>
+          <p:cNvPr id="3" name="Content Placeholder 2"/>
+          <p:cNvSpPr>
+            <a:spLocks noGrp="1"/>
+          </p:cNvSpPr>
+          <p:nvPr>
+            <p:ph idx="1"/>
+          </p:nvPr>
+        </p:nvSpPr>
+        <p:spPr/>
+        <p:txBody>
+          <a:bodyPr/>
+          <a:lstStyle/>
+          <a:p>
+            <a:pPr lvl="0" indent="0" marL="0">
+              <a:buNone/>
+            </a:pPr>
+            <a:r>
+              <a:rPr/>
+              <a:t>You can combine formats if it helps​</a:t>
+            </a:r>
+          </a:p>
+          <a:p>
+            <a:pPr lvl="0"/>
+            <a:r>
+              <a:rPr/>
+              <a:t>You want a rehearsal with EAs only​</a:t>
+            </a:r>
+          </a:p>
+          <a:p>
+            <a:pPr lvl="0"/>
+            <a:r>
+              <a:rPr/>
+              <a:t>You want to make sense of what the stakeholders said (e.g. create the stakeholder playback)​</a:t>
+            </a:r>
+          </a:p>
+          <a:p>
+            <a:pPr lvl="0" indent="0" marL="0">
+              <a:buNone/>
+            </a:pPr>
+            <a:r>
+              <a:rPr/>
+              <a:t>5 to 8 people is an ideal size for the meeting​</a:t>
+            </a:r>
+          </a:p>
+          <a:p>
+            <a:pPr lvl="0" indent="0" marL="0">
+              <a:buNone/>
+            </a:pPr>
+            <a:r>
+              <a:rPr/>
+              <a:t>Give attendees plenty of notice of the meeting</a:t>
+            </a:r>
+          </a:p>
+          <a:p>
+            <a:pPr lvl="0" indent="0" marL="0">
+              <a:buNone/>
+            </a:pPr>
+            <a:r>
+              <a:rPr/>
+              <a:t>Meetings can be fully remote​</a:t>
             </a:r>
           </a:p>
         </p:txBody>

</xml_diff>